<commit_message>
updated details on the presentation
</commit_message>
<xml_diff>
--- a/Presentation/Converting Units Across Multiple Data Sources Using CSV.pptx
+++ b/Presentation/Converting Units Across Multiple Data Sources Using CSV.pptx
@@ -18,27 +18,24 @@
     <p:sldId id="261" r:id="rId12"/>
     <p:sldId id="269" r:id="rId13"/>
     <p:sldId id="265" r:id="rId14"/>
-    <p:sldId id="285" r:id="rId15"/>
-    <p:sldId id="286" r:id="rId16"/>
-    <p:sldId id="288" r:id="rId17"/>
-    <p:sldId id="281" r:id="rId18"/>
-    <p:sldId id="278" r:id="rId19"/>
-    <p:sldId id="296" r:id="rId20"/>
-    <p:sldId id="287" r:id="rId21"/>
-    <p:sldId id="290" r:id="rId22"/>
-    <p:sldId id="291" r:id="rId23"/>
-    <p:sldId id="283" r:id="rId24"/>
-    <p:sldId id="292" r:id="rId25"/>
-    <p:sldId id="293" r:id="rId26"/>
-    <p:sldId id="270" r:id="rId27"/>
-    <p:sldId id="273" r:id="rId28"/>
-    <p:sldId id="275" r:id="rId29"/>
-    <p:sldId id="272" r:id="rId30"/>
-    <p:sldId id="280" r:id="rId31"/>
-    <p:sldId id="271" r:id="rId32"/>
-    <p:sldId id="276" r:id="rId33"/>
-    <p:sldId id="277" r:id="rId34"/>
-    <p:sldId id="295" r:id="rId35"/>
+    <p:sldId id="286" r:id="rId15"/>
+    <p:sldId id="281" r:id="rId16"/>
+    <p:sldId id="296" r:id="rId17"/>
+    <p:sldId id="287" r:id="rId18"/>
+    <p:sldId id="290" r:id="rId19"/>
+    <p:sldId id="291" r:id="rId20"/>
+    <p:sldId id="283" r:id="rId21"/>
+    <p:sldId id="292" r:id="rId22"/>
+    <p:sldId id="293" r:id="rId23"/>
+    <p:sldId id="270" r:id="rId24"/>
+    <p:sldId id="273" r:id="rId25"/>
+    <p:sldId id="275" r:id="rId26"/>
+    <p:sldId id="272" r:id="rId27"/>
+    <p:sldId id="280" r:id="rId28"/>
+    <p:sldId id="271" r:id="rId29"/>
+    <p:sldId id="276" r:id="rId30"/>
+    <p:sldId id="277" r:id="rId31"/>
+    <p:sldId id="295" r:id="rId32"/>
   </p:sldIdLst>
   <p:sldSz cx="12192000" cy="6858000"/>
   <p:notesSz cx="6858000" cy="9144000"/>
@@ -902,7 +899,7 @@
             <a:fld id="{B61BEF0D-F0BB-DE4B-95CE-6DB70DBA9567}" type="datetimeFigureOut">
               <a:rPr lang="en-US" dirty="0"/>
               <a:pPr/>
-              <a:t>3/31/2020</a:t>
+              <a:t>4/1/2020</a:t>
             </a:fld>
             <a:endParaRPr lang="en-US" dirty="0"/>
           </a:p>
@@ -1150,7 +1147,7 @@
             <a:fld id="{B61BEF0D-F0BB-DE4B-95CE-6DB70DBA9567}" type="datetimeFigureOut">
               <a:rPr lang="en-US" dirty="0"/>
               <a:pPr/>
-              <a:t>3/31/2020</a:t>
+              <a:t>4/1/2020</a:t>
             </a:fld>
             <a:endParaRPr lang="en-US" dirty="0"/>
           </a:p>
@@ -1461,7 +1458,7 @@
             <a:fld id="{B61BEF0D-F0BB-DE4B-95CE-6DB70DBA9567}" type="datetimeFigureOut">
               <a:rPr lang="en-US" dirty="0"/>
               <a:pPr/>
-              <a:t>3/31/2020</a:t>
+              <a:t>4/1/2020</a:t>
             </a:fld>
             <a:endParaRPr lang="en-US" dirty="0"/>
           </a:p>
@@ -1791,7 +1788,7 @@
             <a:fld id="{B61BEF0D-F0BB-DE4B-95CE-6DB70DBA9567}" type="datetimeFigureOut">
               <a:rPr lang="en-US" dirty="0"/>
               <a:pPr/>
-              <a:t>3/31/2020</a:t>
+              <a:t>4/1/2020</a:t>
             </a:fld>
             <a:endParaRPr lang="en-US" dirty="0"/>
           </a:p>
@@ -2102,7 +2099,7 @@
             <a:fld id="{B61BEF0D-F0BB-DE4B-95CE-6DB70DBA9567}" type="datetimeFigureOut">
               <a:rPr lang="en-US" dirty="0"/>
               <a:pPr/>
-              <a:t>3/31/2020</a:t>
+              <a:t>4/1/2020</a:t>
             </a:fld>
             <a:endParaRPr lang="en-US" dirty="0"/>
           </a:p>
@@ -2492,7 +2489,7 @@
             <a:fld id="{B61BEF0D-F0BB-DE4B-95CE-6DB70DBA9567}" type="datetimeFigureOut">
               <a:rPr lang="en-US" dirty="0"/>
               <a:pPr/>
-              <a:t>3/31/2020</a:t>
+              <a:t>4/1/2020</a:t>
             </a:fld>
             <a:endParaRPr lang="en-US" dirty="0"/>
           </a:p>
@@ -2658,7 +2655,7 @@
           <a:p>
             <a:fld id="{55C6B4A9-1611-4792-9094-5F34BCA07E0B}" type="datetimeFigureOut">
               <a:rPr lang="en-US" dirty="0"/>
-              <a:t>3/31/2020</a:t>
+              <a:t>4/1/2020</a:t>
             </a:fld>
             <a:endParaRPr lang="en-US" dirty="0"/>
           </a:p>
@@ -2834,7 +2831,7 @@
             <a:fld id="{B61BEF0D-F0BB-DE4B-95CE-6DB70DBA9567}" type="datetimeFigureOut">
               <a:rPr lang="en-US" dirty="0"/>
               <a:pPr/>
-              <a:t>3/31/2020</a:t>
+              <a:t>4/1/2020</a:t>
             </a:fld>
             <a:endParaRPr lang="en-US" dirty="0"/>
           </a:p>
@@ -3000,7 +2997,7 @@
           <a:p>
             <a:fld id="{42A54C80-263E-416B-A8E0-580EDEADCBDC}" type="datetimeFigureOut">
               <a:rPr lang="en-US" dirty="0"/>
-              <a:t>3/31/2020</a:t>
+              <a:t>4/1/2020</a:t>
             </a:fld>
             <a:endParaRPr lang="en-US" dirty="0"/>
           </a:p>
@@ -3243,7 +3240,7 @@
             <a:fld id="{B61BEF0D-F0BB-DE4B-95CE-6DB70DBA9567}" type="datetimeFigureOut">
               <a:rPr lang="en-US" dirty="0"/>
               <a:pPr/>
-              <a:t>3/31/2020</a:t>
+              <a:t>4/1/2020</a:t>
             </a:fld>
             <a:endParaRPr lang="en-US" dirty="0"/>
           </a:p>
@@ -3471,7 +3468,7 @@
           <a:p>
             <a:fld id="{42A54C80-263E-416B-A8E0-580EDEADCBDC}" type="datetimeFigureOut">
               <a:rPr lang="en-US" dirty="0"/>
-              <a:t>3/31/2020</a:t>
+              <a:t>4/1/2020</a:t>
             </a:fld>
             <a:endParaRPr lang="en-US" dirty="0"/>
           </a:p>
@@ -3841,7 +3838,7 @@
             <a:fld id="{B61BEF0D-F0BB-DE4B-95CE-6DB70DBA9567}" type="datetimeFigureOut">
               <a:rPr lang="en-US" dirty="0"/>
               <a:pPr/>
-              <a:t>3/31/2020</a:t>
+              <a:t>4/1/2020</a:t>
             </a:fld>
             <a:endParaRPr lang="en-US" dirty="0"/>
           </a:p>
@@ -3961,7 +3958,7 @@
             <a:fld id="{B61BEF0D-F0BB-DE4B-95CE-6DB70DBA9567}" type="datetimeFigureOut">
               <a:rPr lang="en-US" dirty="0"/>
               <a:pPr/>
-              <a:t>3/31/2020</a:t>
+              <a:t>4/1/2020</a:t>
             </a:fld>
             <a:endParaRPr lang="en-US" dirty="0"/>
           </a:p>
@@ -4053,7 +4050,7 @@
             <a:fld id="{B61BEF0D-F0BB-DE4B-95CE-6DB70DBA9567}" type="datetimeFigureOut">
               <a:rPr lang="en-US" dirty="0"/>
               <a:pPr/>
-              <a:t>3/31/2020</a:t>
+              <a:t>4/1/2020</a:t>
             </a:fld>
             <a:endParaRPr lang="en-US" dirty="0"/>
           </a:p>
@@ -4304,7 +4301,7 @@
           <a:p>
             <a:fld id="{42A54C80-263E-416B-A8E0-580EDEADCBDC}" type="datetimeFigureOut">
               <a:rPr lang="en-US" dirty="0"/>
-              <a:t>3/31/2020</a:t>
+              <a:t>4/1/2020</a:t>
             </a:fld>
             <a:endParaRPr lang="en-US" dirty="0"/>
           </a:p>
@@ -4606,7 +4603,7 @@
             <a:fld id="{B61BEF0D-F0BB-DE4B-95CE-6DB70DBA9567}" type="datetimeFigureOut">
               <a:rPr lang="en-US" dirty="0"/>
               <a:pPr/>
-              <a:t>3/31/2020</a:t>
+              <a:t>4/1/2020</a:t>
             </a:fld>
             <a:endParaRPr lang="en-US" dirty="0"/>
           </a:p>
@@ -5304,7 +5301,7 @@
             <a:fld id="{B61BEF0D-F0BB-DE4B-95CE-6DB70DBA9567}" type="datetimeFigureOut">
               <a:rPr lang="en-US" dirty="0"/>
               <a:pPr/>
-              <a:t>3/31/2020</a:t>
+              <a:t>4/1/2020</a:t>
             </a:fld>
             <a:endParaRPr lang="en-US" dirty="0"/>
           </a:p>
@@ -6233,6 +6230,269 @@
           </a:p>
         </p:txBody>
       </p:sp>
+      <p:sp>
+        <p:nvSpPr>
+          <p:cNvPr id="4" name="Text Placeholder 2">
+            <a:extLst>
+              <a:ext uri="{FF2B5EF4-FFF2-40B4-BE49-F238E27FC236}">
+                <a16:creationId xmlns:a16="http://schemas.microsoft.com/office/drawing/2014/main" id="{08F01F24-6AA5-4D00-AB10-0179415F0329}"/>
+              </a:ext>
+            </a:extLst>
+          </p:cNvPr>
+          <p:cNvSpPr txBox="1">
+            <a:spLocks/>
+          </p:cNvSpPr>
+          <p:nvPr/>
+        </p:nvSpPr>
+        <p:spPr>
+          <a:xfrm>
+            <a:off x="677335" y="5697135"/>
+            <a:ext cx="8596668" cy="860400"/>
+          </a:xfrm>
+          <a:prstGeom prst="rect">
+            <a:avLst/>
+          </a:prstGeom>
+        </p:spPr>
+        <p:txBody>
+          <a:bodyPr vert="horz" lIns="91440" tIns="45720" rIns="91440" bIns="45720" rtlCol="0" anchor="t">
+            <a:normAutofit/>
+          </a:bodyPr>
+          <a:lstStyle>
+            <a:lvl1pPr marL="0" indent="0" algn="r" defTabSz="457200" rtl="0" eaLnBrk="1" latinLnBrk="0" hangingPunct="1">
+              <a:spcBef>
+                <a:spcPts val="1000"/>
+              </a:spcBef>
+              <a:spcAft>
+                <a:spcPts val="0"/>
+              </a:spcAft>
+              <a:buClr>
+                <a:schemeClr val="accent1"/>
+              </a:buClr>
+              <a:buSzPct val="80000"/>
+              <a:buFont typeface="Wingdings 3" charset="2"/>
+              <a:buNone/>
+              <a:defRPr sz="1800" kern="1200">
+                <a:solidFill>
+                  <a:schemeClr val="tx1">
+                    <a:lumMod val="50000"/>
+                    <a:lumOff val="50000"/>
+                  </a:schemeClr>
+                </a:solidFill>
+                <a:latin typeface="+mn-lt"/>
+                <a:ea typeface="+mn-ea"/>
+                <a:cs typeface="+mn-cs"/>
+              </a:defRPr>
+            </a:lvl1pPr>
+            <a:lvl2pPr marL="457200" indent="0" algn="ctr" defTabSz="457200" rtl="0" eaLnBrk="1" latinLnBrk="0" hangingPunct="1">
+              <a:spcBef>
+                <a:spcPts val="1000"/>
+              </a:spcBef>
+              <a:spcAft>
+                <a:spcPts val="0"/>
+              </a:spcAft>
+              <a:buClr>
+                <a:schemeClr val="accent1"/>
+              </a:buClr>
+              <a:buSzPct val="80000"/>
+              <a:buFont typeface="Wingdings 3" charset="2"/>
+              <a:buNone/>
+              <a:defRPr sz="1600" kern="1200">
+                <a:solidFill>
+                  <a:schemeClr val="tx1">
+                    <a:tint val="75000"/>
+                  </a:schemeClr>
+                </a:solidFill>
+                <a:latin typeface="+mn-lt"/>
+                <a:ea typeface="+mn-ea"/>
+                <a:cs typeface="+mn-cs"/>
+              </a:defRPr>
+            </a:lvl2pPr>
+            <a:lvl3pPr marL="914400" indent="0" algn="ctr" defTabSz="457200" rtl="0" eaLnBrk="1" latinLnBrk="0" hangingPunct="1">
+              <a:spcBef>
+                <a:spcPts val="1000"/>
+              </a:spcBef>
+              <a:spcAft>
+                <a:spcPts val="0"/>
+              </a:spcAft>
+              <a:buClr>
+                <a:schemeClr val="accent1"/>
+              </a:buClr>
+              <a:buSzPct val="80000"/>
+              <a:buFont typeface="Wingdings 3" charset="2"/>
+              <a:buNone/>
+              <a:defRPr sz="1400" kern="1200">
+                <a:solidFill>
+                  <a:schemeClr val="tx1">
+                    <a:tint val="75000"/>
+                  </a:schemeClr>
+                </a:solidFill>
+                <a:latin typeface="+mn-lt"/>
+                <a:ea typeface="+mn-ea"/>
+                <a:cs typeface="+mn-cs"/>
+              </a:defRPr>
+            </a:lvl3pPr>
+            <a:lvl4pPr marL="1371600" indent="0" algn="ctr" defTabSz="457200" rtl="0" eaLnBrk="1" latinLnBrk="0" hangingPunct="1">
+              <a:spcBef>
+                <a:spcPts val="1000"/>
+              </a:spcBef>
+              <a:spcAft>
+                <a:spcPts val="0"/>
+              </a:spcAft>
+              <a:buClr>
+                <a:schemeClr val="accent1"/>
+              </a:buClr>
+              <a:buSzPct val="80000"/>
+              <a:buFont typeface="Wingdings 3" charset="2"/>
+              <a:buNone/>
+              <a:defRPr sz="1200" kern="1200">
+                <a:solidFill>
+                  <a:schemeClr val="tx1">
+                    <a:tint val="75000"/>
+                  </a:schemeClr>
+                </a:solidFill>
+                <a:latin typeface="+mn-lt"/>
+                <a:ea typeface="+mn-ea"/>
+                <a:cs typeface="+mn-cs"/>
+              </a:defRPr>
+            </a:lvl4pPr>
+            <a:lvl5pPr marL="1828800" indent="0" algn="ctr" defTabSz="457200" rtl="0" eaLnBrk="1" latinLnBrk="0" hangingPunct="1">
+              <a:spcBef>
+                <a:spcPts val="1000"/>
+              </a:spcBef>
+              <a:spcAft>
+                <a:spcPts val="0"/>
+              </a:spcAft>
+              <a:buClr>
+                <a:schemeClr val="accent1"/>
+              </a:buClr>
+              <a:buSzPct val="80000"/>
+              <a:buFont typeface="Wingdings 3" charset="2"/>
+              <a:buNone/>
+              <a:defRPr sz="1200" kern="1200">
+                <a:solidFill>
+                  <a:schemeClr val="tx1">
+                    <a:tint val="75000"/>
+                  </a:schemeClr>
+                </a:solidFill>
+                <a:latin typeface="+mn-lt"/>
+                <a:ea typeface="+mn-ea"/>
+                <a:cs typeface="+mn-cs"/>
+              </a:defRPr>
+            </a:lvl5pPr>
+            <a:lvl6pPr marL="2286000" indent="0" algn="ctr" defTabSz="457200" rtl="0" eaLnBrk="1" latinLnBrk="0" hangingPunct="1">
+              <a:spcBef>
+                <a:spcPts val="1000"/>
+              </a:spcBef>
+              <a:spcAft>
+                <a:spcPts val="0"/>
+              </a:spcAft>
+              <a:buClr>
+                <a:schemeClr val="accent1"/>
+              </a:buClr>
+              <a:buSzPct val="80000"/>
+              <a:buFont typeface="Wingdings 3" charset="2"/>
+              <a:buNone/>
+              <a:defRPr sz="1200" kern="1200">
+                <a:solidFill>
+                  <a:schemeClr val="tx1">
+                    <a:tint val="75000"/>
+                  </a:schemeClr>
+                </a:solidFill>
+                <a:latin typeface="+mn-lt"/>
+                <a:ea typeface="+mn-ea"/>
+                <a:cs typeface="+mn-cs"/>
+              </a:defRPr>
+            </a:lvl6pPr>
+            <a:lvl7pPr marL="2743200" indent="0" algn="ctr" defTabSz="457200" rtl="0" eaLnBrk="1" latinLnBrk="0" hangingPunct="1">
+              <a:spcBef>
+                <a:spcPts val="1000"/>
+              </a:spcBef>
+              <a:spcAft>
+                <a:spcPts val="0"/>
+              </a:spcAft>
+              <a:buClr>
+                <a:schemeClr val="accent1"/>
+              </a:buClr>
+              <a:buSzPct val="80000"/>
+              <a:buFont typeface="Wingdings 3" charset="2"/>
+              <a:buNone/>
+              <a:defRPr sz="1200" kern="1200">
+                <a:solidFill>
+                  <a:schemeClr val="tx1">
+                    <a:tint val="75000"/>
+                  </a:schemeClr>
+                </a:solidFill>
+                <a:latin typeface="+mn-lt"/>
+                <a:ea typeface="+mn-ea"/>
+                <a:cs typeface="+mn-cs"/>
+              </a:defRPr>
+            </a:lvl7pPr>
+            <a:lvl8pPr marL="3200400" indent="0" algn="ctr" defTabSz="457200" rtl="0" eaLnBrk="1" latinLnBrk="0" hangingPunct="1">
+              <a:spcBef>
+                <a:spcPts val="1000"/>
+              </a:spcBef>
+              <a:spcAft>
+                <a:spcPts val="0"/>
+              </a:spcAft>
+              <a:buClr>
+                <a:schemeClr val="accent1"/>
+              </a:buClr>
+              <a:buSzPct val="80000"/>
+              <a:buFont typeface="Wingdings 3" charset="2"/>
+              <a:buNone/>
+              <a:defRPr sz="1200" kern="1200">
+                <a:solidFill>
+                  <a:schemeClr val="tx1">
+                    <a:tint val="75000"/>
+                  </a:schemeClr>
+                </a:solidFill>
+                <a:latin typeface="+mn-lt"/>
+                <a:ea typeface="+mn-ea"/>
+                <a:cs typeface="+mn-cs"/>
+              </a:defRPr>
+            </a:lvl8pPr>
+            <a:lvl9pPr marL="3657600" indent="0" algn="ctr" defTabSz="457200" rtl="0" eaLnBrk="1" latinLnBrk="0" hangingPunct="1">
+              <a:spcBef>
+                <a:spcPts val="1000"/>
+              </a:spcBef>
+              <a:spcAft>
+                <a:spcPts val="0"/>
+              </a:spcAft>
+              <a:buClr>
+                <a:schemeClr val="accent1"/>
+              </a:buClr>
+              <a:buSzPct val="80000"/>
+              <a:buFont typeface="Wingdings 3" charset="2"/>
+              <a:buNone/>
+              <a:defRPr sz="1200" kern="1200">
+                <a:solidFill>
+                  <a:schemeClr val="tx1">
+                    <a:tint val="75000"/>
+                  </a:schemeClr>
+                </a:solidFill>
+                <a:latin typeface="+mn-lt"/>
+                <a:ea typeface="+mn-ea"/>
+                <a:cs typeface="+mn-cs"/>
+              </a:defRPr>
+            </a:lvl9pPr>
+          </a:lstStyle>
+          <a:p>
+            <a:r>
+              <a:rPr lang="en-US" dirty="0"/>
+              <a:t>Link to presentation, code, dataset and data generator: </a:t>
+            </a:r>
+          </a:p>
+          <a:p>
+            <a:r>
+              <a:rPr lang="en-US" dirty="0">
+                <a:hlinkClick r:id="rId2"/>
+              </a:rPr>
+              <a:t>https://github.com/mihransimonian/Uva-Block3-Big_Data-Assignment</a:t>
+            </a:r>
+            <a:endParaRPr lang="en-US" dirty="0"/>
+          </a:p>
+        </p:txBody>
+      </p:sp>
     </p:spTree>
     <p:extLst>
       <p:ext uri="{BB962C8B-B14F-4D97-AF65-F5344CB8AC3E}">
@@ -6491,6 +6751,269 @@
           </a:p>
         </p:txBody>
       </p:sp>
+      <p:sp>
+        <p:nvSpPr>
+          <p:cNvPr id="4" name="Text Placeholder 2">
+            <a:extLst>
+              <a:ext uri="{FF2B5EF4-FFF2-40B4-BE49-F238E27FC236}">
+                <a16:creationId xmlns:a16="http://schemas.microsoft.com/office/drawing/2014/main" id="{439F5B44-B659-46D8-9820-07F639079B04}"/>
+              </a:ext>
+            </a:extLst>
+          </p:cNvPr>
+          <p:cNvSpPr txBox="1">
+            <a:spLocks/>
+          </p:cNvSpPr>
+          <p:nvPr/>
+        </p:nvSpPr>
+        <p:spPr>
+          <a:xfrm>
+            <a:off x="677335" y="5697135"/>
+            <a:ext cx="8596668" cy="860400"/>
+          </a:xfrm>
+          <a:prstGeom prst="rect">
+            <a:avLst/>
+          </a:prstGeom>
+        </p:spPr>
+        <p:txBody>
+          <a:bodyPr vert="horz" lIns="91440" tIns="45720" rIns="91440" bIns="45720" rtlCol="0" anchor="t">
+            <a:normAutofit/>
+          </a:bodyPr>
+          <a:lstStyle>
+            <a:lvl1pPr marL="0" indent="0" algn="r" defTabSz="457200" rtl="0" eaLnBrk="1" latinLnBrk="0" hangingPunct="1">
+              <a:spcBef>
+                <a:spcPts val="1000"/>
+              </a:spcBef>
+              <a:spcAft>
+                <a:spcPts val="0"/>
+              </a:spcAft>
+              <a:buClr>
+                <a:schemeClr val="accent1"/>
+              </a:buClr>
+              <a:buSzPct val="80000"/>
+              <a:buFont typeface="Wingdings 3" charset="2"/>
+              <a:buNone/>
+              <a:defRPr sz="1800" kern="1200">
+                <a:solidFill>
+                  <a:schemeClr val="tx1">
+                    <a:lumMod val="50000"/>
+                    <a:lumOff val="50000"/>
+                  </a:schemeClr>
+                </a:solidFill>
+                <a:latin typeface="+mn-lt"/>
+                <a:ea typeface="+mn-ea"/>
+                <a:cs typeface="+mn-cs"/>
+              </a:defRPr>
+            </a:lvl1pPr>
+            <a:lvl2pPr marL="457200" indent="0" algn="ctr" defTabSz="457200" rtl="0" eaLnBrk="1" latinLnBrk="0" hangingPunct="1">
+              <a:spcBef>
+                <a:spcPts val="1000"/>
+              </a:spcBef>
+              <a:spcAft>
+                <a:spcPts val="0"/>
+              </a:spcAft>
+              <a:buClr>
+                <a:schemeClr val="accent1"/>
+              </a:buClr>
+              <a:buSzPct val="80000"/>
+              <a:buFont typeface="Wingdings 3" charset="2"/>
+              <a:buNone/>
+              <a:defRPr sz="1600" kern="1200">
+                <a:solidFill>
+                  <a:schemeClr val="tx1">
+                    <a:tint val="75000"/>
+                  </a:schemeClr>
+                </a:solidFill>
+                <a:latin typeface="+mn-lt"/>
+                <a:ea typeface="+mn-ea"/>
+                <a:cs typeface="+mn-cs"/>
+              </a:defRPr>
+            </a:lvl2pPr>
+            <a:lvl3pPr marL="914400" indent="0" algn="ctr" defTabSz="457200" rtl="0" eaLnBrk="1" latinLnBrk="0" hangingPunct="1">
+              <a:spcBef>
+                <a:spcPts val="1000"/>
+              </a:spcBef>
+              <a:spcAft>
+                <a:spcPts val="0"/>
+              </a:spcAft>
+              <a:buClr>
+                <a:schemeClr val="accent1"/>
+              </a:buClr>
+              <a:buSzPct val="80000"/>
+              <a:buFont typeface="Wingdings 3" charset="2"/>
+              <a:buNone/>
+              <a:defRPr sz="1400" kern="1200">
+                <a:solidFill>
+                  <a:schemeClr val="tx1">
+                    <a:tint val="75000"/>
+                  </a:schemeClr>
+                </a:solidFill>
+                <a:latin typeface="+mn-lt"/>
+                <a:ea typeface="+mn-ea"/>
+                <a:cs typeface="+mn-cs"/>
+              </a:defRPr>
+            </a:lvl3pPr>
+            <a:lvl4pPr marL="1371600" indent="0" algn="ctr" defTabSz="457200" rtl="0" eaLnBrk="1" latinLnBrk="0" hangingPunct="1">
+              <a:spcBef>
+                <a:spcPts val="1000"/>
+              </a:spcBef>
+              <a:spcAft>
+                <a:spcPts val="0"/>
+              </a:spcAft>
+              <a:buClr>
+                <a:schemeClr val="accent1"/>
+              </a:buClr>
+              <a:buSzPct val="80000"/>
+              <a:buFont typeface="Wingdings 3" charset="2"/>
+              <a:buNone/>
+              <a:defRPr sz="1200" kern="1200">
+                <a:solidFill>
+                  <a:schemeClr val="tx1">
+                    <a:tint val="75000"/>
+                  </a:schemeClr>
+                </a:solidFill>
+                <a:latin typeface="+mn-lt"/>
+                <a:ea typeface="+mn-ea"/>
+                <a:cs typeface="+mn-cs"/>
+              </a:defRPr>
+            </a:lvl4pPr>
+            <a:lvl5pPr marL="1828800" indent="0" algn="ctr" defTabSz="457200" rtl="0" eaLnBrk="1" latinLnBrk="0" hangingPunct="1">
+              <a:spcBef>
+                <a:spcPts val="1000"/>
+              </a:spcBef>
+              <a:spcAft>
+                <a:spcPts val="0"/>
+              </a:spcAft>
+              <a:buClr>
+                <a:schemeClr val="accent1"/>
+              </a:buClr>
+              <a:buSzPct val="80000"/>
+              <a:buFont typeface="Wingdings 3" charset="2"/>
+              <a:buNone/>
+              <a:defRPr sz="1200" kern="1200">
+                <a:solidFill>
+                  <a:schemeClr val="tx1">
+                    <a:tint val="75000"/>
+                  </a:schemeClr>
+                </a:solidFill>
+                <a:latin typeface="+mn-lt"/>
+                <a:ea typeface="+mn-ea"/>
+                <a:cs typeface="+mn-cs"/>
+              </a:defRPr>
+            </a:lvl5pPr>
+            <a:lvl6pPr marL="2286000" indent="0" algn="ctr" defTabSz="457200" rtl="0" eaLnBrk="1" latinLnBrk="0" hangingPunct="1">
+              <a:spcBef>
+                <a:spcPts val="1000"/>
+              </a:spcBef>
+              <a:spcAft>
+                <a:spcPts val="0"/>
+              </a:spcAft>
+              <a:buClr>
+                <a:schemeClr val="accent1"/>
+              </a:buClr>
+              <a:buSzPct val="80000"/>
+              <a:buFont typeface="Wingdings 3" charset="2"/>
+              <a:buNone/>
+              <a:defRPr sz="1200" kern="1200">
+                <a:solidFill>
+                  <a:schemeClr val="tx1">
+                    <a:tint val="75000"/>
+                  </a:schemeClr>
+                </a:solidFill>
+                <a:latin typeface="+mn-lt"/>
+                <a:ea typeface="+mn-ea"/>
+                <a:cs typeface="+mn-cs"/>
+              </a:defRPr>
+            </a:lvl6pPr>
+            <a:lvl7pPr marL="2743200" indent="0" algn="ctr" defTabSz="457200" rtl="0" eaLnBrk="1" latinLnBrk="0" hangingPunct="1">
+              <a:spcBef>
+                <a:spcPts val="1000"/>
+              </a:spcBef>
+              <a:spcAft>
+                <a:spcPts val="0"/>
+              </a:spcAft>
+              <a:buClr>
+                <a:schemeClr val="accent1"/>
+              </a:buClr>
+              <a:buSzPct val="80000"/>
+              <a:buFont typeface="Wingdings 3" charset="2"/>
+              <a:buNone/>
+              <a:defRPr sz="1200" kern="1200">
+                <a:solidFill>
+                  <a:schemeClr val="tx1">
+                    <a:tint val="75000"/>
+                  </a:schemeClr>
+                </a:solidFill>
+                <a:latin typeface="+mn-lt"/>
+                <a:ea typeface="+mn-ea"/>
+                <a:cs typeface="+mn-cs"/>
+              </a:defRPr>
+            </a:lvl7pPr>
+            <a:lvl8pPr marL="3200400" indent="0" algn="ctr" defTabSz="457200" rtl="0" eaLnBrk="1" latinLnBrk="0" hangingPunct="1">
+              <a:spcBef>
+                <a:spcPts val="1000"/>
+              </a:spcBef>
+              <a:spcAft>
+                <a:spcPts val="0"/>
+              </a:spcAft>
+              <a:buClr>
+                <a:schemeClr val="accent1"/>
+              </a:buClr>
+              <a:buSzPct val="80000"/>
+              <a:buFont typeface="Wingdings 3" charset="2"/>
+              <a:buNone/>
+              <a:defRPr sz="1200" kern="1200">
+                <a:solidFill>
+                  <a:schemeClr val="tx1">
+                    <a:tint val="75000"/>
+                  </a:schemeClr>
+                </a:solidFill>
+                <a:latin typeface="+mn-lt"/>
+                <a:ea typeface="+mn-ea"/>
+                <a:cs typeface="+mn-cs"/>
+              </a:defRPr>
+            </a:lvl8pPr>
+            <a:lvl9pPr marL="3657600" indent="0" algn="ctr" defTabSz="457200" rtl="0" eaLnBrk="1" latinLnBrk="0" hangingPunct="1">
+              <a:spcBef>
+                <a:spcPts val="1000"/>
+              </a:spcBef>
+              <a:spcAft>
+                <a:spcPts val="0"/>
+              </a:spcAft>
+              <a:buClr>
+                <a:schemeClr val="accent1"/>
+              </a:buClr>
+              <a:buSzPct val="80000"/>
+              <a:buFont typeface="Wingdings 3" charset="2"/>
+              <a:buNone/>
+              <a:defRPr sz="1200" kern="1200">
+                <a:solidFill>
+                  <a:schemeClr val="tx1">
+                    <a:tint val="75000"/>
+                  </a:schemeClr>
+                </a:solidFill>
+                <a:latin typeface="+mn-lt"/>
+                <a:ea typeface="+mn-ea"/>
+                <a:cs typeface="+mn-cs"/>
+              </a:defRPr>
+            </a:lvl9pPr>
+          </a:lstStyle>
+          <a:p>
+            <a:r>
+              <a:rPr lang="en-US" dirty="0"/>
+              <a:t>Link to presentation, code, dataset and data generator: </a:t>
+            </a:r>
+          </a:p>
+          <a:p>
+            <a:r>
+              <a:rPr lang="en-US" dirty="0">
+                <a:hlinkClick r:id="rId2"/>
+              </a:rPr>
+              <a:t>https://github.com/mihransimonian/Uva-Block3-Big_Data-Assignment</a:t>
+            </a:r>
+            <a:endParaRPr lang="en-US" dirty="0"/>
+          </a:p>
+        </p:txBody>
+      </p:sp>
     </p:spTree>
     <p:extLst>
       <p:ext uri="{BB962C8B-B14F-4D97-AF65-F5344CB8AC3E}">
@@ -6667,187 +7190,6 @@
 </file>
 
 <file path=ppt/slides/slide14.xml><?xml version="1.0" encoding="utf-8"?>
-<p:sld xmlns:a="http://schemas.openxmlformats.org/drawingml/2006/main" xmlns:r="http://schemas.openxmlformats.org/officeDocument/2006/relationships" xmlns:p="http://schemas.openxmlformats.org/presentationml/2006/main">
-  <p:cSld>
-    <p:spTree>
-      <p:nvGrpSpPr>
-        <p:cNvPr id="1" name=""/>
-        <p:cNvGrpSpPr/>
-        <p:nvPr/>
-      </p:nvGrpSpPr>
-      <p:grpSpPr>
-        <a:xfrm>
-          <a:off x="0" y="0"/>
-          <a:ext cx="0" cy="0"/>
-          <a:chOff x="0" y="0"/>
-          <a:chExt cx="0" cy="0"/>
-        </a:xfrm>
-      </p:grpSpPr>
-      <p:sp>
-        <p:nvSpPr>
-          <p:cNvPr id="2" name="Title 1">
-            <a:extLst>
-              <a:ext uri="{FF2B5EF4-FFF2-40B4-BE49-F238E27FC236}">
-                <a16:creationId xmlns:a16="http://schemas.microsoft.com/office/drawing/2014/main" id="{E2D5BA66-3210-4E08-BF94-0B89CFD35086}"/>
-              </a:ext>
-            </a:extLst>
-          </p:cNvPr>
-          <p:cNvSpPr>
-            <a:spLocks noGrp="1"/>
-          </p:cNvSpPr>
-          <p:nvPr>
-            <p:ph type="title"/>
-          </p:nvPr>
-        </p:nvSpPr>
-        <p:spPr/>
-        <p:txBody>
-          <a:bodyPr/>
-          <a:lstStyle/>
-          <a:p>
-            <a:r>
-              <a:rPr lang="en-US" dirty="0"/>
-              <a:t>Implementation – Back to Basics: How to Convert A Unit?</a:t>
-            </a:r>
-          </a:p>
-        </p:txBody>
-      </p:sp>
-      <p:sp>
-        <p:nvSpPr>
-          <p:cNvPr id="3" name="Content Placeholder 2">
-            <a:extLst>
-              <a:ext uri="{FF2B5EF4-FFF2-40B4-BE49-F238E27FC236}">
-                <a16:creationId xmlns:a16="http://schemas.microsoft.com/office/drawing/2014/main" id="{79832D4C-B6C5-462C-8C0A-2C94E22E9E71}"/>
-              </a:ext>
-            </a:extLst>
-          </p:cNvPr>
-          <p:cNvSpPr>
-            <a:spLocks noGrp="1"/>
-          </p:cNvSpPr>
-          <p:nvPr>
-            <p:ph idx="1"/>
-          </p:nvPr>
-        </p:nvSpPr>
-        <p:spPr/>
-        <p:txBody>
-          <a:bodyPr>
-            <a:normAutofit/>
-          </a:bodyPr>
-          <a:lstStyle/>
-          <a:p>
-            <a:r>
-              <a:rPr lang="en-US" dirty="0"/>
-              <a:t>1. Apply formula:</a:t>
-            </a:r>
-          </a:p>
-          <a:p>
-            <a:pPr lvl="1"/>
-            <a:r>
-              <a:rPr lang="en-US" dirty="0"/>
-              <a:t>E.g. Fahrenheit to Celsius:</a:t>
-            </a:r>
-          </a:p>
-          <a:p>
-            <a:pPr algn="ctr"/>
-            <a:r>
-              <a:rPr lang="en-US" i="1" dirty="0"/>
-              <a:t>T</a:t>
-            </a:r>
-            <a:r>
-              <a:rPr lang="en-US" baseline="-25000" dirty="0"/>
-              <a:t>(°C)</a:t>
-            </a:r>
-            <a:r>
-              <a:rPr lang="en-US" dirty="0"/>
-              <a:t> = (</a:t>
-            </a:r>
-            <a:r>
-              <a:rPr lang="en-US" i="1" dirty="0"/>
-              <a:t>T</a:t>
-            </a:r>
-            <a:r>
-              <a:rPr lang="en-US" baseline="-25000" dirty="0"/>
-              <a:t>(°F)</a:t>
-            </a:r>
-            <a:r>
-              <a:rPr lang="en-US" dirty="0"/>
-              <a:t> - 32) × 5/9</a:t>
-            </a:r>
-          </a:p>
-          <a:p>
-            <a:endParaRPr lang="en-US" dirty="0"/>
-          </a:p>
-          <a:p>
-            <a:endParaRPr lang="en-US" dirty="0"/>
-          </a:p>
-          <a:p>
-            <a:endParaRPr lang="en-US" dirty="0"/>
-          </a:p>
-          <a:p>
-            <a:r>
-              <a:rPr lang="en-US" dirty="0"/>
-              <a:t>2. Multiply by static number</a:t>
-            </a:r>
-          </a:p>
-          <a:p>
-            <a:pPr lvl="1"/>
-            <a:r>
-              <a:rPr lang="en-US" dirty="0"/>
-              <a:t>Inches to Centimeter:</a:t>
-            </a:r>
-          </a:p>
-          <a:p>
-            <a:pPr algn="ctr"/>
-            <a:r>
-              <a:rPr lang="en-US" i="1" dirty="0"/>
-              <a:t>D</a:t>
-            </a:r>
-            <a:r>
-              <a:rPr lang="en-US" i="1" baseline="-25000" dirty="0"/>
-              <a:t>(cm</a:t>
-            </a:r>
-            <a:r>
-              <a:rPr lang="en-US" baseline="-25000" dirty="0"/>
-              <a:t>)</a:t>
-            </a:r>
-            <a:r>
-              <a:rPr lang="en-US" dirty="0"/>
-              <a:t> = </a:t>
-            </a:r>
-            <a:r>
-              <a:rPr lang="en-US" i="1" dirty="0"/>
-              <a:t>d</a:t>
-            </a:r>
-            <a:r>
-              <a:rPr lang="en-US" baseline="-25000" dirty="0"/>
-              <a:t>(inches)</a:t>
-            </a:r>
-            <a:r>
-              <a:rPr lang="en-US" dirty="0"/>
-              <a:t> * 2.54</a:t>
-            </a:r>
-          </a:p>
-          <a:p>
-            <a:pPr marL="0" indent="0">
-              <a:buNone/>
-            </a:pPr>
-            <a:endParaRPr lang="en-US" dirty="0"/>
-          </a:p>
-        </p:txBody>
-      </p:sp>
-    </p:spTree>
-    <p:extLst>
-      <p:ext uri="{BB962C8B-B14F-4D97-AF65-F5344CB8AC3E}">
-        <p14:creationId xmlns:p14="http://schemas.microsoft.com/office/powerpoint/2010/main" val="4281137521"/>
-      </p:ext>
-    </p:extLst>
-  </p:cSld>
-  <p:clrMapOvr>
-    <a:masterClrMapping/>
-  </p:clrMapOvr>
-</p:sld>
-</file>
-
-<file path=ppt/slides/slide15.xml><?xml version="1.0" encoding="utf-8"?>
 <p:sld xmlns:a="http://schemas.openxmlformats.org/drawingml/2006/main" xmlns:r="http://schemas.openxmlformats.org/officeDocument/2006/relationships" xmlns:p="http://schemas.openxmlformats.org/presentationml/2006/main">
   <p:cSld>
     <p:spTree>
@@ -7058,148 +7400,7 @@
 </p:sld>
 </file>
 
-<file path=ppt/slides/slide16.xml><?xml version="1.0" encoding="utf-8"?>
-<p:sld xmlns:a="http://schemas.openxmlformats.org/drawingml/2006/main" xmlns:r="http://schemas.openxmlformats.org/officeDocument/2006/relationships" xmlns:p="http://schemas.openxmlformats.org/presentationml/2006/main">
-  <p:cSld>
-    <p:spTree>
-      <p:nvGrpSpPr>
-        <p:cNvPr id="1" name=""/>
-        <p:cNvGrpSpPr/>
-        <p:nvPr/>
-      </p:nvGrpSpPr>
-      <p:grpSpPr>
-        <a:xfrm>
-          <a:off x="0" y="0"/>
-          <a:ext cx="0" cy="0"/>
-          <a:chOff x="0" y="0"/>
-          <a:chExt cx="0" cy="0"/>
-        </a:xfrm>
-      </p:grpSpPr>
-      <p:sp>
-        <p:nvSpPr>
-          <p:cNvPr id="2" name="Title 1">
-            <a:extLst>
-              <a:ext uri="{FF2B5EF4-FFF2-40B4-BE49-F238E27FC236}">
-                <a16:creationId xmlns:a16="http://schemas.microsoft.com/office/drawing/2014/main" id="{E2D5BA66-3210-4E08-BF94-0B89CFD35086}"/>
-              </a:ext>
-            </a:extLst>
-          </p:cNvPr>
-          <p:cNvSpPr>
-            <a:spLocks noGrp="1"/>
-          </p:cNvSpPr>
-          <p:nvPr>
-            <p:ph type="title"/>
-          </p:nvPr>
-        </p:nvSpPr>
-        <p:spPr/>
-        <p:txBody>
-          <a:bodyPr/>
-          <a:lstStyle/>
-          <a:p>
-            <a:r>
-              <a:rPr lang="en-US" dirty="0"/>
-              <a:t>Proposed Method – CSV Unit Conversion?</a:t>
-            </a:r>
-          </a:p>
-        </p:txBody>
-      </p:sp>
-      <p:sp>
-        <p:nvSpPr>
-          <p:cNvPr id="3" name="Content Placeholder 2">
-            <a:extLst>
-              <a:ext uri="{FF2B5EF4-FFF2-40B4-BE49-F238E27FC236}">
-                <a16:creationId xmlns:a16="http://schemas.microsoft.com/office/drawing/2014/main" id="{79832D4C-B6C5-462C-8C0A-2C94E22E9E71}"/>
-              </a:ext>
-            </a:extLst>
-          </p:cNvPr>
-          <p:cNvSpPr>
-            <a:spLocks noGrp="1"/>
-          </p:cNvSpPr>
-          <p:nvPr>
-            <p:ph idx="1"/>
-          </p:nvPr>
-        </p:nvSpPr>
-        <p:spPr>
-          <a:xfrm>
-            <a:off x="677334" y="2160589"/>
-            <a:ext cx="4331546" cy="3880773"/>
-          </a:xfrm>
-        </p:spPr>
-        <p:txBody>
-          <a:bodyPr>
-            <a:normAutofit lnSpcReduction="10000"/>
-          </a:bodyPr>
-          <a:lstStyle/>
-          <a:p>
-            <a:r>
-              <a:rPr lang="en-US" dirty="0"/>
-              <a:t>Dictionary can contain both methods for unit conversion (static and formula)</a:t>
-            </a:r>
-          </a:p>
-          <a:p>
-            <a:endParaRPr lang="en-US" dirty="0"/>
-          </a:p>
-          <a:p>
-            <a:r>
-              <a:rPr lang="en-US" dirty="0"/>
-              <a:t>A conversion number</a:t>
-            </a:r>
-          </a:p>
-          <a:p>
-            <a:endParaRPr lang="en-US" dirty="0"/>
-          </a:p>
-          <a:p>
-            <a:endParaRPr lang="en-US" dirty="0"/>
-          </a:p>
-          <a:p>
-            <a:r>
-              <a:rPr lang="en-US" dirty="0"/>
-              <a:t>Special case: a formula</a:t>
-            </a:r>
-          </a:p>
-          <a:p>
-            <a:pPr lvl="1"/>
-            <a:r>
-              <a:rPr lang="en-US" dirty="0"/>
-              <a:t>Read a string to memory location</a:t>
-            </a:r>
-          </a:p>
-          <a:p>
-            <a:pPr lvl="1"/>
-            <a:r>
-              <a:rPr lang="en-US" dirty="0"/>
-              <a:t>Update dictionary and create a pointer to the memory location</a:t>
-            </a:r>
-          </a:p>
-          <a:p>
-            <a:pPr lvl="1"/>
-            <a:endParaRPr lang="en-US" dirty="0"/>
-          </a:p>
-          <a:p>
-            <a:endParaRPr lang="en-US" dirty="0"/>
-          </a:p>
-          <a:p>
-            <a:endParaRPr lang="en-US" dirty="0"/>
-          </a:p>
-          <a:p>
-            <a:endParaRPr lang="en-US" dirty="0"/>
-          </a:p>
-        </p:txBody>
-      </p:sp>
-    </p:spTree>
-    <p:extLst>
-      <p:ext uri="{BB962C8B-B14F-4D97-AF65-F5344CB8AC3E}">
-        <p14:creationId xmlns:p14="http://schemas.microsoft.com/office/powerpoint/2010/main" val="2819737099"/>
-      </p:ext>
-    </p:extLst>
-  </p:cSld>
-  <p:clrMapOvr>
-    <a:masterClrMapping/>
-  </p:clrMapOvr>
-</p:sld>
-</file>
-
-<file path=ppt/slides/slide17.xml><?xml version="1.0" encoding="utf-8"?>
+<file path=ppt/slides/slide15.xml><?xml version="1.0" encoding="utf-8"?>
 <p:sld xmlns:a="http://schemas.openxmlformats.org/drawingml/2006/main" xmlns:r="http://schemas.openxmlformats.org/officeDocument/2006/relationships" xmlns:p="http://schemas.openxmlformats.org/presentationml/2006/main">
   <p:cSld>
     <p:spTree>
@@ -7430,173 +7631,7 @@
 </p:sld>
 </file>
 
-<file path=ppt/slides/slide18.xml><?xml version="1.0" encoding="utf-8"?>
-<p:sld xmlns:a="http://schemas.openxmlformats.org/drawingml/2006/main" xmlns:r="http://schemas.openxmlformats.org/officeDocument/2006/relationships" xmlns:p="http://schemas.openxmlformats.org/presentationml/2006/main">
-  <p:cSld>
-    <p:spTree>
-      <p:nvGrpSpPr>
-        <p:cNvPr id="1" name=""/>
-        <p:cNvGrpSpPr/>
-        <p:nvPr/>
-      </p:nvGrpSpPr>
-      <p:grpSpPr>
-        <a:xfrm>
-          <a:off x="0" y="0"/>
-          <a:ext cx="0" cy="0"/>
-          <a:chOff x="0" y="0"/>
-          <a:chExt cx="0" cy="0"/>
-        </a:xfrm>
-      </p:grpSpPr>
-      <p:sp>
-        <p:nvSpPr>
-          <p:cNvPr id="2" name="Title 1">
-            <a:extLst>
-              <a:ext uri="{FF2B5EF4-FFF2-40B4-BE49-F238E27FC236}">
-                <a16:creationId xmlns:a16="http://schemas.microsoft.com/office/drawing/2014/main" id="{E2D5BA66-3210-4E08-BF94-0B89CFD35086}"/>
-              </a:ext>
-            </a:extLst>
-          </p:cNvPr>
-          <p:cNvSpPr>
-            <a:spLocks noGrp="1"/>
-          </p:cNvSpPr>
-          <p:nvPr>
-            <p:ph type="title"/>
-          </p:nvPr>
-        </p:nvSpPr>
-        <p:spPr/>
-        <p:txBody>
-          <a:bodyPr/>
-          <a:lstStyle/>
-          <a:p>
-            <a:r>
-              <a:rPr lang="en-US" dirty="0"/>
-              <a:t>Proposed Method – Dots, Decimal Points and Thousand Separators</a:t>
-            </a:r>
-          </a:p>
-        </p:txBody>
-      </p:sp>
-      <p:sp>
-        <p:nvSpPr>
-          <p:cNvPr id="3" name="Content Placeholder 2">
-            <a:extLst>
-              <a:ext uri="{FF2B5EF4-FFF2-40B4-BE49-F238E27FC236}">
-                <a16:creationId xmlns:a16="http://schemas.microsoft.com/office/drawing/2014/main" id="{79832D4C-B6C5-462C-8C0A-2C94E22E9E71}"/>
-              </a:ext>
-            </a:extLst>
-          </p:cNvPr>
-          <p:cNvSpPr>
-            <a:spLocks noGrp="1"/>
-          </p:cNvSpPr>
-          <p:nvPr>
-            <p:ph idx="1"/>
-          </p:nvPr>
-        </p:nvSpPr>
-        <p:spPr>
-          <a:xfrm>
-            <a:off x="677334" y="2160589"/>
-            <a:ext cx="5065098" cy="3880773"/>
-          </a:xfrm>
-        </p:spPr>
-        <p:txBody>
-          <a:bodyPr>
-            <a:normAutofit fontScale="92500" lnSpcReduction="20000"/>
-          </a:bodyPr>
-          <a:lstStyle/>
-          <a:p>
-            <a:r>
-              <a:rPr lang="en-US" dirty="0"/>
-              <a:t>Countries use different systems</a:t>
-            </a:r>
-          </a:p>
-          <a:p>
-            <a:pPr lvl="1"/>
-            <a:r>
-              <a:rPr lang="en-US" dirty="0"/>
-              <a:t>Choose to use decimal point</a:t>
-            </a:r>
-          </a:p>
-          <a:p>
-            <a:endParaRPr lang="en-US" dirty="0"/>
-          </a:p>
-          <a:p>
-            <a:r>
-              <a:rPr lang="en-US" dirty="0"/>
-              <a:t>Software can create thousand separators</a:t>
-            </a:r>
-          </a:p>
-          <a:p>
-            <a:pPr lvl="1"/>
-            <a:r>
-              <a:rPr lang="en-US" dirty="0"/>
-              <a:t>Excel</a:t>
-            </a:r>
-          </a:p>
-          <a:p>
-            <a:pPr lvl="2"/>
-            <a:r>
-              <a:rPr lang="en-US" dirty="0"/>
-              <a:t>US: commas</a:t>
-            </a:r>
-          </a:p>
-          <a:p>
-            <a:pPr lvl="2"/>
-            <a:r>
-              <a:rPr lang="en-US" dirty="0"/>
-              <a:t>Netherlands: dots</a:t>
-            </a:r>
-          </a:p>
-          <a:p>
-            <a:endParaRPr lang="en-US" dirty="0"/>
-          </a:p>
-          <a:p>
-            <a:r>
-              <a:rPr lang="en-US" dirty="0"/>
-              <a:t>Sometimes your values are stored in strings</a:t>
-            </a:r>
-          </a:p>
-          <a:p>
-            <a:pPr lvl="1"/>
-            <a:r>
-              <a:rPr lang="en-US" dirty="0"/>
-              <a:t>Try: float(</a:t>
-            </a:r>
-            <a:r>
-              <a:rPr lang="en-US" dirty="0" err="1"/>
-              <a:t>number_which_is_now_in_string</a:t>
-            </a:r>
-            <a:r>
-              <a:rPr lang="en-US" dirty="0"/>
-              <a:t>)</a:t>
-            </a:r>
-          </a:p>
-          <a:p>
-            <a:endParaRPr lang="en-US" dirty="0"/>
-          </a:p>
-          <a:p>
-            <a:r>
-              <a:rPr lang="en-US" dirty="0"/>
-              <a:t>Error handling included</a:t>
-            </a:r>
-          </a:p>
-          <a:p>
-            <a:endParaRPr lang="en-US" dirty="0"/>
-          </a:p>
-        </p:txBody>
-      </p:sp>
-    </p:spTree>
-    <p:extLst>
-      <p:ext uri="{BB962C8B-B14F-4D97-AF65-F5344CB8AC3E}">
-        <p14:creationId xmlns:p14="http://schemas.microsoft.com/office/powerpoint/2010/main" val="2714742019"/>
-      </p:ext>
-    </p:extLst>
-  </p:cSld>
-  <p:clrMapOvr>
-    <a:masterClrMapping/>
-  </p:clrMapOvr>
-</p:sld>
-</file>
-
-<file path=ppt/slides/slide19.xml><?xml version="1.0" encoding="utf-8"?>
+<file path=ppt/slides/slide16.xml><?xml version="1.0" encoding="utf-8"?>
 <p:sld xmlns:a="http://schemas.openxmlformats.org/drawingml/2006/main" xmlns:r="http://schemas.openxmlformats.org/officeDocument/2006/relationships" xmlns:p="http://schemas.openxmlformats.org/presentationml/2006/main">
   <p:cSld>
     <p:spTree>
@@ -7792,7 +7827,7 @@
 </p:sld>
 </file>
 
-<file path=ppt/slides/slide2.xml><?xml version="1.0" encoding="utf-8"?>
+<file path=ppt/slides/slide17.xml><?xml version="1.0" encoding="utf-8"?>
 <p:sld xmlns:a="http://schemas.openxmlformats.org/drawingml/2006/main" xmlns:r="http://schemas.openxmlformats.org/officeDocument/2006/relationships" xmlns:p="http://schemas.openxmlformats.org/presentationml/2006/main">
   <p:cSld>
     <p:spTree>
@@ -7825,19 +7860,14 @@
             <p:ph type="title"/>
           </p:nvPr>
         </p:nvSpPr>
-        <p:spPr>
-          <a:xfrm>
-            <a:off x="677334" y="609600"/>
-            <a:ext cx="8192346" cy="1320800"/>
-          </a:xfrm>
-        </p:spPr>
+        <p:spPr/>
         <p:txBody>
           <a:bodyPr/>
           <a:lstStyle/>
           <a:p>
             <a:r>
               <a:rPr lang="en-US" dirty="0"/>
-              <a:t>Introduction – What Are Measurement Units?</a:t>
+              <a:t>Proposed Method – Error Handling</a:t>
             </a:r>
           </a:p>
         </p:txBody>
@@ -7858,7 +7888,12 @@
             <p:ph idx="1"/>
           </p:nvPr>
         </p:nvSpPr>
-        <p:spPr/>
+        <p:spPr>
+          <a:xfrm>
+            <a:off x="677334" y="2160589"/>
+            <a:ext cx="8596668" cy="3880773"/>
+          </a:xfrm>
+        </p:spPr>
         <p:txBody>
           <a:bodyPr>
             <a:normAutofit fontScale="92500" lnSpcReduction="10000"/>
@@ -7867,180 +7902,88 @@
           <a:p>
             <a:r>
               <a:rPr lang="en-US" dirty="0"/>
-              <a:t>Describe a measurement: Temperature / Distance / Weight etc.</a:t>
-            </a:r>
-          </a:p>
-          <a:p>
-            <a:endParaRPr lang="en-US" dirty="0"/>
-          </a:p>
-          <a:p>
-            <a:r>
-              <a:rPr lang="en-US" dirty="0"/>
-              <a:t>Different systems in the world, generally:</a:t>
+              <a:t>Error handling included in functions</a:t>
+            </a:r>
+          </a:p>
+          <a:p>
+            <a:endParaRPr lang="en-US" dirty="0"/>
+          </a:p>
+          <a:p>
+            <a:r>
+              <a:rPr lang="en-US" dirty="0"/>
+              <a:t>Main case: the variable is not the correct datatype</a:t>
             </a:r>
           </a:p>
           <a:p>
             <a:pPr lvl="1"/>
             <a:r>
               <a:rPr lang="en-US" dirty="0"/>
-              <a:t>Metric system (SI)</a:t>
-            </a:r>
-          </a:p>
-          <a:p>
-            <a:pPr lvl="2"/>
+              <a:t>String is delivered expect a float</a:t>
+            </a:r>
+          </a:p>
+          <a:p>
+            <a:pPr lvl="1"/>
+            <a:r>
+              <a:rPr lang="en-US" dirty="0"/>
+              <a:t>Boolean delivered expect a float</a:t>
+            </a:r>
+          </a:p>
+          <a:p>
+            <a:pPr marL="0" indent="0">
+              <a:buNone/>
+            </a:pPr>
+            <a:endParaRPr lang="en-US" dirty="0"/>
+          </a:p>
+          <a:p>
+            <a:r>
+              <a:rPr lang="en-US" dirty="0"/>
+              <a:t>Solution:</a:t>
+            </a:r>
+          </a:p>
+          <a:p>
+            <a:pPr lvl="1"/>
+            <a:r>
+              <a:rPr lang="en-US" dirty="0"/>
+              <a:t>Return string</a:t>
+            </a:r>
+          </a:p>
+          <a:p>
+            <a:pPr lvl="1"/>
+            <a:r>
+              <a:rPr lang="en-US" dirty="0"/>
+              <a:t>Raise </a:t>
+            </a:r>
             <a:r>
               <a:rPr lang="en-US" dirty="0" err="1"/>
-              <a:t>Système</a:t>
-            </a:r>
-            <a:r>
-              <a:rPr lang="en-US" dirty="0"/>
-              <a:t> international </a:t>
-            </a:r>
-            <a:r>
-              <a:rPr lang="en-US" dirty="0" err="1"/>
-              <a:t>d'unites</a:t>
-            </a:r>
-            <a:endParaRPr lang="en-US" dirty="0"/>
-          </a:p>
-          <a:p>
-            <a:pPr lvl="2"/>
-            <a:r>
-              <a:rPr lang="en-US" dirty="0"/>
-              <a:t>95% of the world</a:t>
+              <a:t>RuntimeError</a:t>
+            </a:r>
+            <a:r>
+              <a:rPr lang="en-US" dirty="0"/>
+              <a:t> with datatype given and custom message (included in each function</a:t>
             </a:r>
           </a:p>
           <a:p>
             <a:pPr lvl="1"/>
-            <a:r>
-              <a:rPr lang="en-US" dirty="0"/>
-              <a:t>US customary system: USA</a:t>
-            </a:r>
-          </a:p>
-          <a:p>
-            <a:pPr lvl="1"/>
-            <a:r>
-              <a:rPr lang="en-US" dirty="0"/>
-              <a:t>Burmese system: Burma</a:t>
-            </a:r>
-          </a:p>
-          <a:p>
-            <a:pPr lvl="1"/>
-            <a:endParaRPr lang="en-US" dirty="0"/>
-          </a:p>
-          <a:p>
-            <a:r>
-              <a:rPr lang="en-US" dirty="0"/>
-              <a:t>Specific niches sometimes are applied, even today:</a:t>
-            </a:r>
-          </a:p>
-          <a:p>
-            <a:pPr lvl="1"/>
-            <a:r>
-              <a:rPr lang="en-US" dirty="0"/>
-              <a:t>Imperial (UK)</a:t>
-            </a:r>
-          </a:p>
-        </p:txBody>
-      </p:sp>
-      <p:pic>
-        <p:nvPicPr>
-          <p:cNvPr id="7170" name="Picture 2" descr="International Measuring System of Units by Country">
-            <a:extLst>
-              <a:ext uri="{FF2B5EF4-FFF2-40B4-BE49-F238E27FC236}">
-                <a16:creationId xmlns:a16="http://schemas.microsoft.com/office/drawing/2014/main" id="{EFF746EC-8C27-45B5-8CB8-B7701C959A9C}"/>
-              </a:ext>
-            </a:extLst>
-          </p:cNvPr>
-          <p:cNvPicPr>
-            <a:picLocks noChangeAspect="1" noChangeArrowheads="1"/>
-          </p:cNvPicPr>
-          <p:nvPr/>
-        </p:nvPicPr>
-        <p:blipFill>
-          <a:blip r:embed="rId2">
-            <a:extLst>
-              <a:ext uri="{28A0092B-C50C-407E-A947-70E740481C1C}">
-                <a14:useLocalDpi xmlns:a14="http://schemas.microsoft.com/office/drawing/2010/main" val="0"/>
-              </a:ext>
-            </a:extLst>
-          </a:blip>
-          <a:srcRect/>
-          <a:stretch>
-            <a:fillRect/>
-          </a:stretch>
-        </p:blipFill>
-        <p:spPr bwMode="auto">
-          <a:xfrm>
-            <a:off x="7109792" y="2703444"/>
-            <a:ext cx="4814680" cy="2407340"/>
-          </a:xfrm>
-          <a:prstGeom prst="rect">
-            <a:avLst/>
-          </a:prstGeom>
-          <a:noFill/>
-          <a:extLst>
-            <a:ext uri="{909E8E84-426E-40DD-AFC4-6F175D3DCCD1}">
-              <a14:hiddenFill xmlns:a14="http://schemas.microsoft.com/office/drawing/2010/main">
-                <a:solidFill>
-                  <a:srgbClr val="FFFFFF"/>
-                </a:solidFill>
-              </a14:hiddenFill>
-            </a:ext>
-          </a:extLst>
-        </p:spPr>
-      </p:pic>
-      <p:sp>
-        <p:nvSpPr>
-          <p:cNvPr id="5" name="Rectangle 4">
-            <a:extLst>
-              <a:ext uri="{FF2B5EF4-FFF2-40B4-BE49-F238E27FC236}">
-                <a16:creationId xmlns:a16="http://schemas.microsoft.com/office/drawing/2014/main" id="{984668DF-36DA-4781-81F3-D9F5494542B7}"/>
-              </a:ext>
-            </a:extLst>
-          </p:cNvPr>
-          <p:cNvSpPr/>
-          <p:nvPr/>
-        </p:nvSpPr>
-        <p:spPr>
-          <a:xfrm>
-            <a:off x="5821680" y="6445717"/>
-            <a:ext cx="6096000" cy="276999"/>
-          </a:xfrm>
-          <a:prstGeom prst="rect">
-            <a:avLst/>
-          </a:prstGeom>
-        </p:spPr>
-        <p:txBody>
-          <a:bodyPr wrap="square">
-            <a:spAutoFit/>
-          </a:bodyPr>
-          <a:lstStyle/>
-          <a:p>
-            <a:pPr algn="r"/>
-            <a:r>
-              <a:rPr lang="en-US" sz="1200" dirty="0"/>
-              <a:t>Source image: </a:t>
-            </a:r>
-            <a:r>
-              <a:rPr lang="en-US" sz="1200" dirty="0">
-                <a:hlinkClick r:id="rId3">
-                  <a:extLst>
-                    <a:ext uri="{A12FA001-AC4F-418D-AE19-62706E023703}">
-                      <ahyp:hlinkClr xmlns:ahyp="http://schemas.microsoft.com/office/drawing/2018/hyperlinkcolor" val="tx"/>
-                    </a:ext>
-                  </a:extLst>
-                </a:hlinkClick>
-              </a:rPr>
-              <a:t>http://chartsbin.com/view/d12</a:t>
-            </a:r>
-            <a:endParaRPr lang="en-US" sz="1200" dirty="0"/>
+            <a:endParaRPr lang="en-US" dirty="0"/>
+          </a:p>
+          <a:p>
+            <a:r>
+              <a:rPr lang="en-US" dirty="0"/>
+              <a:t>Using Booleans to determine whether to use error handling or not</a:t>
+            </a:r>
+          </a:p>
+          <a:p>
+            <a:endParaRPr lang="en-US" dirty="0"/>
+          </a:p>
+          <a:p>
+            <a:endParaRPr lang="en-US" dirty="0"/>
           </a:p>
         </p:txBody>
       </p:sp>
     </p:spTree>
     <p:extLst>
       <p:ext uri="{BB962C8B-B14F-4D97-AF65-F5344CB8AC3E}">
-        <p14:creationId xmlns:p14="http://schemas.microsoft.com/office/powerpoint/2010/main" val="2903732376"/>
+        <p14:creationId xmlns:p14="http://schemas.microsoft.com/office/powerpoint/2010/main" val="537207174"/>
       </p:ext>
     </p:extLst>
   </p:cSld>
@@ -8050,7 +7993,7 @@
 </p:sld>
 </file>
 
-<file path=ppt/slides/slide20.xml><?xml version="1.0" encoding="utf-8"?>
+<file path=ppt/slides/slide18.xml><?xml version="1.0" encoding="utf-8"?>
 <p:sld xmlns:a="http://schemas.openxmlformats.org/drawingml/2006/main" xmlns:r="http://schemas.openxmlformats.org/officeDocument/2006/relationships" xmlns:p="http://schemas.openxmlformats.org/presentationml/2006/main">
   <p:cSld>
     <p:spTree>
@@ -8119,172 +8062,6 @@
         </p:spPr>
         <p:txBody>
           <a:bodyPr>
-            <a:normAutofit fontScale="92500" lnSpcReduction="10000"/>
-          </a:bodyPr>
-          <a:lstStyle/>
-          <a:p>
-            <a:r>
-              <a:rPr lang="en-US" dirty="0"/>
-              <a:t>Error handling included in functions</a:t>
-            </a:r>
-          </a:p>
-          <a:p>
-            <a:endParaRPr lang="en-US" dirty="0"/>
-          </a:p>
-          <a:p>
-            <a:r>
-              <a:rPr lang="en-US" dirty="0"/>
-              <a:t>Main case: the variable is not the correct datatype</a:t>
-            </a:r>
-          </a:p>
-          <a:p>
-            <a:pPr lvl="1"/>
-            <a:r>
-              <a:rPr lang="en-US" dirty="0"/>
-              <a:t>String is delivered expect a float</a:t>
-            </a:r>
-          </a:p>
-          <a:p>
-            <a:pPr lvl="1"/>
-            <a:r>
-              <a:rPr lang="en-US" dirty="0"/>
-              <a:t>Boolean delivered expect a float</a:t>
-            </a:r>
-          </a:p>
-          <a:p>
-            <a:pPr marL="0" indent="0">
-              <a:buNone/>
-            </a:pPr>
-            <a:endParaRPr lang="en-US" dirty="0"/>
-          </a:p>
-          <a:p>
-            <a:r>
-              <a:rPr lang="en-US" dirty="0"/>
-              <a:t>Solution:</a:t>
-            </a:r>
-          </a:p>
-          <a:p>
-            <a:pPr lvl="1"/>
-            <a:r>
-              <a:rPr lang="en-US" dirty="0"/>
-              <a:t>Return string</a:t>
-            </a:r>
-          </a:p>
-          <a:p>
-            <a:pPr lvl="1"/>
-            <a:r>
-              <a:rPr lang="en-US" dirty="0"/>
-              <a:t>Raise </a:t>
-            </a:r>
-            <a:r>
-              <a:rPr lang="en-US" dirty="0" err="1"/>
-              <a:t>RuntimeError</a:t>
-            </a:r>
-            <a:r>
-              <a:rPr lang="en-US" dirty="0"/>
-              <a:t> with datatype given and custom message (included in each function</a:t>
-            </a:r>
-          </a:p>
-          <a:p>
-            <a:pPr lvl="1"/>
-            <a:endParaRPr lang="en-US" dirty="0"/>
-          </a:p>
-          <a:p>
-            <a:r>
-              <a:rPr lang="en-US" dirty="0"/>
-              <a:t>Using Booleans to determine whether to use error handling or not</a:t>
-            </a:r>
-          </a:p>
-          <a:p>
-            <a:endParaRPr lang="en-US" dirty="0"/>
-          </a:p>
-          <a:p>
-            <a:endParaRPr lang="en-US" dirty="0"/>
-          </a:p>
-        </p:txBody>
-      </p:sp>
-    </p:spTree>
-    <p:extLst>
-      <p:ext uri="{BB962C8B-B14F-4D97-AF65-F5344CB8AC3E}">
-        <p14:creationId xmlns:p14="http://schemas.microsoft.com/office/powerpoint/2010/main" val="537207174"/>
-      </p:ext>
-    </p:extLst>
-  </p:cSld>
-  <p:clrMapOvr>
-    <a:masterClrMapping/>
-  </p:clrMapOvr>
-</p:sld>
-</file>
-
-<file path=ppt/slides/slide21.xml><?xml version="1.0" encoding="utf-8"?>
-<p:sld xmlns:a="http://schemas.openxmlformats.org/drawingml/2006/main" xmlns:r="http://schemas.openxmlformats.org/officeDocument/2006/relationships" xmlns:p="http://schemas.openxmlformats.org/presentationml/2006/main">
-  <p:cSld>
-    <p:spTree>
-      <p:nvGrpSpPr>
-        <p:cNvPr id="1" name=""/>
-        <p:cNvGrpSpPr/>
-        <p:nvPr/>
-      </p:nvGrpSpPr>
-      <p:grpSpPr>
-        <a:xfrm>
-          <a:off x="0" y="0"/>
-          <a:ext cx="0" cy="0"/>
-          <a:chOff x="0" y="0"/>
-          <a:chExt cx="0" cy="0"/>
-        </a:xfrm>
-      </p:grpSpPr>
-      <p:sp>
-        <p:nvSpPr>
-          <p:cNvPr id="2" name="Title 1">
-            <a:extLst>
-              <a:ext uri="{FF2B5EF4-FFF2-40B4-BE49-F238E27FC236}">
-                <a16:creationId xmlns:a16="http://schemas.microsoft.com/office/drawing/2014/main" id="{E2D5BA66-3210-4E08-BF94-0B89CFD35086}"/>
-              </a:ext>
-            </a:extLst>
-          </p:cNvPr>
-          <p:cNvSpPr>
-            <a:spLocks noGrp="1"/>
-          </p:cNvSpPr>
-          <p:nvPr>
-            <p:ph type="title"/>
-          </p:nvPr>
-        </p:nvSpPr>
-        <p:spPr/>
-        <p:txBody>
-          <a:bodyPr/>
-          <a:lstStyle/>
-          <a:p>
-            <a:r>
-              <a:rPr lang="en-US" dirty="0"/>
-              <a:t>Proposed Method – Error Handling</a:t>
-            </a:r>
-          </a:p>
-        </p:txBody>
-      </p:sp>
-      <p:sp>
-        <p:nvSpPr>
-          <p:cNvPr id="3" name="Content Placeholder 2">
-            <a:extLst>
-              <a:ext uri="{FF2B5EF4-FFF2-40B4-BE49-F238E27FC236}">
-                <a16:creationId xmlns:a16="http://schemas.microsoft.com/office/drawing/2014/main" id="{79832D4C-B6C5-462C-8C0A-2C94E22E9E71}"/>
-              </a:ext>
-            </a:extLst>
-          </p:cNvPr>
-          <p:cNvSpPr>
-            <a:spLocks noGrp="1"/>
-          </p:cNvSpPr>
-          <p:nvPr>
-            <p:ph idx="1"/>
-          </p:nvPr>
-        </p:nvSpPr>
-        <p:spPr>
-          <a:xfrm>
-            <a:off x="677334" y="2160589"/>
-            <a:ext cx="8596668" cy="3880773"/>
-          </a:xfrm>
-        </p:spPr>
-        <p:txBody>
-          <a:bodyPr>
             <a:normAutofit fontScale="92500"/>
           </a:bodyPr>
           <a:lstStyle/>
@@ -8430,7 +8207,7 @@
 </p:sld>
 </file>
 
-<file path=ppt/slides/slide22.xml><?xml version="1.0" encoding="utf-8"?>
+<file path=ppt/slides/slide19.xml><?xml version="1.0" encoding="utf-8"?>
 <p:sld xmlns:a="http://schemas.openxmlformats.org/drawingml/2006/main" xmlns:r="http://schemas.openxmlformats.org/officeDocument/2006/relationships" xmlns:p="http://schemas.openxmlformats.org/presentationml/2006/main">
   <p:cSld>
     <p:spTree>
@@ -8674,7 +8451,7 @@
 </p:sld>
 </file>
 
-<file path=ppt/slides/slide23.xml><?xml version="1.0" encoding="utf-8"?>
+<file path=ppt/slides/slide2.xml><?xml version="1.0" encoding="utf-8"?>
 <p:sld xmlns:a="http://schemas.openxmlformats.org/drawingml/2006/main" xmlns:r="http://schemas.openxmlformats.org/officeDocument/2006/relationships" xmlns:p="http://schemas.openxmlformats.org/presentationml/2006/main">
   <p:cSld>
     <p:spTree>
@@ -8707,6 +8484,264 @@
             <p:ph type="title"/>
           </p:nvPr>
         </p:nvSpPr>
+        <p:spPr>
+          <a:xfrm>
+            <a:off x="677334" y="609600"/>
+            <a:ext cx="8192346" cy="1320800"/>
+          </a:xfrm>
+        </p:spPr>
+        <p:txBody>
+          <a:bodyPr/>
+          <a:lstStyle/>
+          <a:p>
+            <a:r>
+              <a:rPr lang="en-US" dirty="0"/>
+              <a:t>Introduction – What Are Measurement Units?</a:t>
+            </a:r>
+          </a:p>
+        </p:txBody>
+      </p:sp>
+      <p:sp>
+        <p:nvSpPr>
+          <p:cNvPr id="3" name="Content Placeholder 2">
+            <a:extLst>
+              <a:ext uri="{FF2B5EF4-FFF2-40B4-BE49-F238E27FC236}">
+                <a16:creationId xmlns:a16="http://schemas.microsoft.com/office/drawing/2014/main" id="{79832D4C-B6C5-462C-8C0A-2C94E22E9E71}"/>
+              </a:ext>
+            </a:extLst>
+          </p:cNvPr>
+          <p:cNvSpPr>
+            <a:spLocks noGrp="1"/>
+          </p:cNvSpPr>
+          <p:nvPr>
+            <p:ph idx="1"/>
+          </p:nvPr>
+        </p:nvSpPr>
+        <p:spPr/>
+        <p:txBody>
+          <a:bodyPr>
+            <a:normAutofit fontScale="92500" lnSpcReduction="10000"/>
+          </a:bodyPr>
+          <a:lstStyle/>
+          <a:p>
+            <a:r>
+              <a:rPr lang="en-US" dirty="0"/>
+              <a:t>Describe a measurement: Temperature / Distance / Weight etc.</a:t>
+            </a:r>
+          </a:p>
+          <a:p>
+            <a:endParaRPr lang="en-US" dirty="0"/>
+          </a:p>
+          <a:p>
+            <a:r>
+              <a:rPr lang="en-US" dirty="0"/>
+              <a:t>Different systems in the world, generally:</a:t>
+            </a:r>
+          </a:p>
+          <a:p>
+            <a:pPr lvl="1"/>
+            <a:r>
+              <a:rPr lang="en-US" dirty="0"/>
+              <a:t>Metric system (SI)</a:t>
+            </a:r>
+          </a:p>
+          <a:p>
+            <a:pPr lvl="2"/>
+            <a:r>
+              <a:rPr lang="en-US" dirty="0" err="1"/>
+              <a:t>Système</a:t>
+            </a:r>
+            <a:r>
+              <a:rPr lang="en-US" dirty="0"/>
+              <a:t> international </a:t>
+            </a:r>
+            <a:r>
+              <a:rPr lang="en-US" dirty="0" err="1"/>
+              <a:t>d'unites</a:t>
+            </a:r>
+            <a:endParaRPr lang="en-US" dirty="0"/>
+          </a:p>
+          <a:p>
+            <a:pPr lvl="2"/>
+            <a:r>
+              <a:rPr lang="en-US" dirty="0"/>
+              <a:t>95% of the world</a:t>
+            </a:r>
+          </a:p>
+          <a:p>
+            <a:pPr lvl="1"/>
+            <a:r>
+              <a:rPr lang="en-US" dirty="0"/>
+              <a:t>US customary system: USA</a:t>
+            </a:r>
+          </a:p>
+          <a:p>
+            <a:pPr lvl="1"/>
+            <a:r>
+              <a:rPr lang="en-US" dirty="0"/>
+              <a:t>Burmese system: Burma</a:t>
+            </a:r>
+          </a:p>
+          <a:p>
+            <a:pPr lvl="1"/>
+            <a:endParaRPr lang="en-US" dirty="0"/>
+          </a:p>
+          <a:p>
+            <a:r>
+              <a:rPr lang="en-US" dirty="0"/>
+              <a:t>Specific niches sometimes are applied, even today:</a:t>
+            </a:r>
+          </a:p>
+          <a:p>
+            <a:pPr lvl="1"/>
+            <a:r>
+              <a:rPr lang="en-US" dirty="0"/>
+              <a:t>Imperial (UK)</a:t>
+            </a:r>
+          </a:p>
+        </p:txBody>
+      </p:sp>
+      <p:pic>
+        <p:nvPicPr>
+          <p:cNvPr id="7170" name="Picture 2" descr="International Measuring System of Units by Country">
+            <a:extLst>
+              <a:ext uri="{FF2B5EF4-FFF2-40B4-BE49-F238E27FC236}">
+                <a16:creationId xmlns:a16="http://schemas.microsoft.com/office/drawing/2014/main" id="{EFF746EC-8C27-45B5-8CB8-B7701C959A9C}"/>
+              </a:ext>
+            </a:extLst>
+          </p:cNvPr>
+          <p:cNvPicPr>
+            <a:picLocks noChangeAspect="1" noChangeArrowheads="1"/>
+          </p:cNvPicPr>
+          <p:nvPr/>
+        </p:nvPicPr>
+        <p:blipFill>
+          <a:blip r:embed="rId2">
+            <a:extLst>
+              <a:ext uri="{28A0092B-C50C-407E-A947-70E740481C1C}">
+                <a14:useLocalDpi xmlns:a14="http://schemas.microsoft.com/office/drawing/2010/main" val="0"/>
+              </a:ext>
+            </a:extLst>
+          </a:blip>
+          <a:srcRect/>
+          <a:stretch>
+            <a:fillRect/>
+          </a:stretch>
+        </p:blipFill>
+        <p:spPr bwMode="auto">
+          <a:xfrm>
+            <a:off x="7109792" y="2703444"/>
+            <a:ext cx="4814680" cy="2407340"/>
+          </a:xfrm>
+          <a:prstGeom prst="rect">
+            <a:avLst/>
+          </a:prstGeom>
+          <a:noFill/>
+          <a:extLst>
+            <a:ext uri="{909E8E84-426E-40DD-AFC4-6F175D3DCCD1}">
+              <a14:hiddenFill xmlns:a14="http://schemas.microsoft.com/office/drawing/2010/main">
+                <a:solidFill>
+                  <a:srgbClr val="FFFFFF"/>
+                </a:solidFill>
+              </a14:hiddenFill>
+            </a:ext>
+          </a:extLst>
+        </p:spPr>
+      </p:pic>
+      <p:sp>
+        <p:nvSpPr>
+          <p:cNvPr id="5" name="Rectangle 4">
+            <a:extLst>
+              <a:ext uri="{FF2B5EF4-FFF2-40B4-BE49-F238E27FC236}">
+                <a16:creationId xmlns:a16="http://schemas.microsoft.com/office/drawing/2014/main" id="{984668DF-36DA-4781-81F3-D9F5494542B7}"/>
+              </a:ext>
+            </a:extLst>
+          </p:cNvPr>
+          <p:cNvSpPr/>
+          <p:nvPr/>
+        </p:nvSpPr>
+        <p:spPr>
+          <a:xfrm>
+            <a:off x="5821680" y="6445717"/>
+            <a:ext cx="6096000" cy="276999"/>
+          </a:xfrm>
+          <a:prstGeom prst="rect">
+            <a:avLst/>
+          </a:prstGeom>
+        </p:spPr>
+        <p:txBody>
+          <a:bodyPr wrap="square">
+            <a:spAutoFit/>
+          </a:bodyPr>
+          <a:lstStyle/>
+          <a:p>
+            <a:pPr algn="r"/>
+            <a:r>
+              <a:rPr lang="en-US" sz="1200" dirty="0"/>
+              <a:t>Source image: </a:t>
+            </a:r>
+            <a:r>
+              <a:rPr lang="en-US" sz="1200" dirty="0">
+                <a:hlinkClick r:id="rId3">
+                  <a:extLst>
+                    <a:ext uri="{A12FA001-AC4F-418D-AE19-62706E023703}">
+                      <ahyp:hlinkClr xmlns:ahyp="http://schemas.microsoft.com/office/drawing/2018/hyperlinkcolor" val="tx"/>
+                    </a:ext>
+                  </a:extLst>
+                </a:hlinkClick>
+              </a:rPr>
+              <a:t>http://chartsbin.com/view/d12</a:t>
+            </a:r>
+            <a:endParaRPr lang="en-US" sz="1200" dirty="0"/>
+          </a:p>
+        </p:txBody>
+      </p:sp>
+    </p:spTree>
+    <p:extLst>
+      <p:ext uri="{BB962C8B-B14F-4D97-AF65-F5344CB8AC3E}">
+        <p14:creationId xmlns:p14="http://schemas.microsoft.com/office/powerpoint/2010/main" val="2903732376"/>
+      </p:ext>
+    </p:extLst>
+  </p:cSld>
+  <p:clrMapOvr>
+    <a:masterClrMapping/>
+  </p:clrMapOvr>
+</p:sld>
+</file>
+
+<file path=ppt/slides/slide20.xml><?xml version="1.0" encoding="utf-8"?>
+<p:sld xmlns:a="http://schemas.openxmlformats.org/drawingml/2006/main" xmlns:r="http://schemas.openxmlformats.org/officeDocument/2006/relationships" xmlns:p="http://schemas.openxmlformats.org/presentationml/2006/main">
+  <p:cSld>
+    <p:spTree>
+      <p:nvGrpSpPr>
+        <p:cNvPr id="1" name=""/>
+        <p:cNvGrpSpPr/>
+        <p:nvPr/>
+      </p:nvGrpSpPr>
+      <p:grpSpPr>
+        <a:xfrm>
+          <a:off x="0" y="0"/>
+          <a:ext cx="0" cy="0"/>
+          <a:chOff x="0" y="0"/>
+          <a:chExt cx="0" cy="0"/>
+        </a:xfrm>
+      </p:grpSpPr>
+      <p:sp>
+        <p:nvSpPr>
+          <p:cNvPr id="2" name="Title 1">
+            <a:extLst>
+              <a:ext uri="{FF2B5EF4-FFF2-40B4-BE49-F238E27FC236}">
+                <a16:creationId xmlns:a16="http://schemas.microsoft.com/office/drawing/2014/main" id="{E2D5BA66-3210-4E08-BF94-0B89CFD35086}"/>
+              </a:ext>
+            </a:extLst>
+          </p:cNvPr>
+          <p:cNvSpPr>
+            <a:spLocks noGrp="1"/>
+          </p:cNvSpPr>
+          <p:nvPr>
+            <p:ph type="title"/>
+          </p:nvPr>
+        </p:nvSpPr>
         <p:spPr/>
         <p:txBody>
           <a:bodyPr/>
@@ -8826,7 +8861,7 @@
 </p:sld>
 </file>
 
-<file path=ppt/slides/slide24.xml><?xml version="1.0" encoding="utf-8"?>
+<file path=ppt/slides/slide21.xml><?xml version="1.0" encoding="utf-8"?>
 <p:sld xmlns:a="http://schemas.openxmlformats.org/drawingml/2006/main" xmlns:r="http://schemas.openxmlformats.org/officeDocument/2006/relationships" xmlns:p="http://schemas.openxmlformats.org/presentationml/2006/main">
   <p:cSld>
     <p:spTree>
@@ -8983,7 +9018,7 @@
 </p:sld>
 </file>
 
-<file path=ppt/slides/slide25.xml><?xml version="1.0" encoding="utf-8"?>
+<file path=ppt/slides/slide22.xml><?xml version="1.0" encoding="utf-8"?>
 <p:sld xmlns:a="http://schemas.openxmlformats.org/drawingml/2006/main" xmlns:r="http://schemas.openxmlformats.org/officeDocument/2006/relationships" xmlns:p="http://schemas.openxmlformats.org/presentationml/2006/main">
   <p:cSld>
     <p:spTree>
@@ -9155,6 +9190,651 @@
 </p:sld>
 </file>
 
+<file path=ppt/slides/slide23.xml><?xml version="1.0" encoding="utf-8"?>
+<p:sld xmlns:a="http://schemas.openxmlformats.org/drawingml/2006/main" xmlns:r="http://schemas.openxmlformats.org/officeDocument/2006/relationships" xmlns:p="http://schemas.openxmlformats.org/presentationml/2006/main">
+  <p:cSld>
+    <p:spTree>
+      <p:nvGrpSpPr>
+        <p:cNvPr id="1" name=""/>
+        <p:cNvGrpSpPr/>
+        <p:nvPr/>
+      </p:nvGrpSpPr>
+      <p:grpSpPr>
+        <a:xfrm>
+          <a:off x="0" y="0"/>
+          <a:ext cx="0" cy="0"/>
+          <a:chOff x="0" y="0"/>
+          <a:chExt cx="0" cy="0"/>
+        </a:xfrm>
+      </p:grpSpPr>
+      <p:sp>
+        <p:nvSpPr>
+          <p:cNvPr id="2" name="Title 1">
+            <a:extLst>
+              <a:ext uri="{FF2B5EF4-FFF2-40B4-BE49-F238E27FC236}">
+                <a16:creationId xmlns:a16="http://schemas.microsoft.com/office/drawing/2014/main" id="{B28018A3-3CE5-4418-8CF8-15522FB0C656}"/>
+              </a:ext>
+            </a:extLst>
+          </p:cNvPr>
+          <p:cNvSpPr>
+            <a:spLocks noGrp="1"/>
+          </p:cNvSpPr>
+          <p:nvPr>
+            <p:ph type="title"/>
+          </p:nvPr>
+        </p:nvSpPr>
+        <p:spPr/>
+        <p:txBody>
+          <a:bodyPr/>
+          <a:lstStyle/>
+          <a:p>
+            <a:pPr algn="ctr"/>
+            <a:r>
+              <a:rPr lang="en-US" dirty="0"/>
+              <a:t>Upscaling To Big Data</a:t>
+            </a:r>
+          </a:p>
+        </p:txBody>
+      </p:sp>
+      <p:sp>
+        <p:nvSpPr>
+          <p:cNvPr id="3" name="Text Placeholder 2">
+            <a:extLst>
+              <a:ext uri="{FF2B5EF4-FFF2-40B4-BE49-F238E27FC236}">
+                <a16:creationId xmlns:a16="http://schemas.microsoft.com/office/drawing/2014/main" id="{7E3B1D62-302E-4E1B-B440-3F5B16CA1A4C}"/>
+              </a:ext>
+            </a:extLst>
+          </p:cNvPr>
+          <p:cNvSpPr>
+            <a:spLocks noGrp="1"/>
+          </p:cNvSpPr>
+          <p:nvPr>
+            <p:ph type="body" idx="1"/>
+          </p:nvPr>
+        </p:nvSpPr>
+        <p:spPr/>
+        <p:txBody>
+          <a:bodyPr/>
+          <a:lstStyle/>
+          <a:p>
+            <a:endParaRPr lang="en-US"/>
+          </a:p>
+        </p:txBody>
+      </p:sp>
+      <p:sp>
+        <p:nvSpPr>
+          <p:cNvPr id="4" name="Text Placeholder 2">
+            <a:extLst>
+              <a:ext uri="{FF2B5EF4-FFF2-40B4-BE49-F238E27FC236}">
+                <a16:creationId xmlns:a16="http://schemas.microsoft.com/office/drawing/2014/main" id="{2BB66666-058F-4449-828A-794346D22E8B}"/>
+              </a:ext>
+            </a:extLst>
+          </p:cNvPr>
+          <p:cNvSpPr txBox="1">
+            <a:spLocks/>
+          </p:cNvSpPr>
+          <p:nvPr/>
+        </p:nvSpPr>
+        <p:spPr>
+          <a:xfrm>
+            <a:off x="677335" y="5697135"/>
+            <a:ext cx="8596668" cy="860400"/>
+          </a:xfrm>
+          <a:prstGeom prst="rect">
+            <a:avLst/>
+          </a:prstGeom>
+        </p:spPr>
+        <p:txBody>
+          <a:bodyPr vert="horz" lIns="91440" tIns="45720" rIns="91440" bIns="45720" rtlCol="0" anchor="t">
+            <a:normAutofit/>
+          </a:bodyPr>
+          <a:lstStyle>
+            <a:lvl1pPr marL="0" indent="0" algn="r" defTabSz="457200" rtl="0" eaLnBrk="1" latinLnBrk="0" hangingPunct="1">
+              <a:spcBef>
+                <a:spcPts val="1000"/>
+              </a:spcBef>
+              <a:spcAft>
+                <a:spcPts val="0"/>
+              </a:spcAft>
+              <a:buClr>
+                <a:schemeClr val="accent1"/>
+              </a:buClr>
+              <a:buSzPct val="80000"/>
+              <a:buFont typeface="Wingdings 3" charset="2"/>
+              <a:buNone/>
+              <a:defRPr sz="1800" kern="1200">
+                <a:solidFill>
+                  <a:schemeClr val="tx1">
+                    <a:lumMod val="50000"/>
+                    <a:lumOff val="50000"/>
+                  </a:schemeClr>
+                </a:solidFill>
+                <a:latin typeface="+mn-lt"/>
+                <a:ea typeface="+mn-ea"/>
+                <a:cs typeface="+mn-cs"/>
+              </a:defRPr>
+            </a:lvl1pPr>
+            <a:lvl2pPr marL="457200" indent="0" algn="ctr" defTabSz="457200" rtl="0" eaLnBrk="1" latinLnBrk="0" hangingPunct="1">
+              <a:spcBef>
+                <a:spcPts val="1000"/>
+              </a:spcBef>
+              <a:spcAft>
+                <a:spcPts val="0"/>
+              </a:spcAft>
+              <a:buClr>
+                <a:schemeClr val="accent1"/>
+              </a:buClr>
+              <a:buSzPct val="80000"/>
+              <a:buFont typeface="Wingdings 3" charset="2"/>
+              <a:buNone/>
+              <a:defRPr sz="1600" kern="1200">
+                <a:solidFill>
+                  <a:schemeClr val="tx1">
+                    <a:tint val="75000"/>
+                  </a:schemeClr>
+                </a:solidFill>
+                <a:latin typeface="+mn-lt"/>
+                <a:ea typeface="+mn-ea"/>
+                <a:cs typeface="+mn-cs"/>
+              </a:defRPr>
+            </a:lvl2pPr>
+            <a:lvl3pPr marL="914400" indent="0" algn="ctr" defTabSz="457200" rtl="0" eaLnBrk="1" latinLnBrk="0" hangingPunct="1">
+              <a:spcBef>
+                <a:spcPts val="1000"/>
+              </a:spcBef>
+              <a:spcAft>
+                <a:spcPts val="0"/>
+              </a:spcAft>
+              <a:buClr>
+                <a:schemeClr val="accent1"/>
+              </a:buClr>
+              <a:buSzPct val="80000"/>
+              <a:buFont typeface="Wingdings 3" charset="2"/>
+              <a:buNone/>
+              <a:defRPr sz="1400" kern="1200">
+                <a:solidFill>
+                  <a:schemeClr val="tx1">
+                    <a:tint val="75000"/>
+                  </a:schemeClr>
+                </a:solidFill>
+                <a:latin typeface="+mn-lt"/>
+                <a:ea typeface="+mn-ea"/>
+                <a:cs typeface="+mn-cs"/>
+              </a:defRPr>
+            </a:lvl3pPr>
+            <a:lvl4pPr marL="1371600" indent="0" algn="ctr" defTabSz="457200" rtl="0" eaLnBrk="1" latinLnBrk="0" hangingPunct="1">
+              <a:spcBef>
+                <a:spcPts val="1000"/>
+              </a:spcBef>
+              <a:spcAft>
+                <a:spcPts val="0"/>
+              </a:spcAft>
+              <a:buClr>
+                <a:schemeClr val="accent1"/>
+              </a:buClr>
+              <a:buSzPct val="80000"/>
+              <a:buFont typeface="Wingdings 3" charset="2"/>
+              <a:buNone/>
+              <a:defRPr sz="1200" kern="1200">
+                <a:solidFill>
+                  <a:schemeClr val="tx1">
+                    <a:tint val="75000"/>
+                  </a:schemeClr>
+                </a:solidFill>
+                <a:latin typeface="+mn-lt"/>
+                <a:ea typeface="+mn-ea"/>
+                <a:cs typeface="+mn-cs"/>
+              </a:defRPr>
+            </a:lvl4pPr>
+            <a:lvl5pPr marL="1828800" indent="0" algn="ctr" defTabSz="457200" rtl="0" eaLnBrk="1" latinLnBrk="0" hangingPunct="1">
+              <a:spcBef>
+                <a:spcPts val="1000"/>
+              </a:spcBef>
+              <a:spcAft>
+                <a:spcPts val="0"/>
+              </a:spcAft>
+              <a:buClr>
+                <a:schemeClr val="accent1"/>
+              </a:buClr>
+              <a:buSzPct val="80000"/>
+              <a:buFont typeface="Wingdings 3" charset="2"/>
+              <a:buNone/>
+              <a:defRPr sz="1200" kern="1200">
+                <a:solidFill>
+                  <a:schemeClr val="tx1">
+                    <a:tint val="75000"/>
+                  </a:schemeClr>
+                </a:solidFill>
+                <a:latin typeface="+mn-lt"/>
+                <a:ea typeface="+mn-ea"/>
+                <a:cs typeface="+mn-cs"/>
+              </a:defRPr>
+            </a:lvl5pPr>
+            <a:lvl6pPr marL="2286000" indent="0" algn="ctr" defTabSz="457200" rtl="0" eaLnBrk="1" latinLnBrk="0" hangingPunct="1">
+              <a:spcBef>
+                <a:spcPts val="1000"/>
+              </a:spcBef>
+              <a:spcAft>
+                <a:spcPts val="0"/>
+              </a:spcAft>
+              <a:buClr>
+                <a:schemeClr val="accent1"/>
+              </a:buClr>
+              <a:buSzPct val="80000"/>
+              <a:buFont typeface="Wingdings 3" charset="2"/>
+              <a:buNone/>
+              <a:defRPr sz="1200" kern="1200">
+                <a:solidFill>
+                  <a:schemeClr val="tx1">
+                    <a:tint val="75000"/>
+                  </a:schemeClr>
+                </a:solidFill>
+                <a:latin typeface="+mn-lt"/>
+                <a:ea typeface="+mn-ea"/>
+                <a:cs typeface="+mn-cs"/>
+              </a:defRPr>
+            </a:lvl6pPr>
+            <a:lvl7pPr marL="2743200" indent="0" algn="ctr" defTabSz="457200" rtl="0" eaLnBrk="1" latinLnBrk="0" hangingPunct="1">
+              <a:spcBef>
+                <a:spcPts val="1000"/>
+              </a:spcBef>
+              <a:spcAft>
+                <a:spcPts val="0"/>
+              </a:spcAft>
+              <a:buClr>
+                <a:schemeClr val="accent1"/>
+              </a:buClr>
+              <a:buSzPct val="80000"/>
+              <a:buFont typeface="Wingdings 3" charset="2"/>
+              <a:buNone/>
+              <a:defRPr sz="1200" kern="1200">
+                <a:solidFill>
+                  <a:schemeClr val="tx1">
+                    <a:tint val="75000"/>
+                  </a:schemeClr>
+                </a:solidFill>
+                <a:latin typeface="+mn-lt"/>
+                <a:ea typeface="+mn-ea"/>
+                <a:cs typeface="+mn-cs"/>
+              </a:defRPr>
+            </a:lvl7pPr>
+            <a:lvl8pPr marL="3200400" indent="0" algn="ctr" defTabSz="457200" rtl="0" eaLnBrk="1" latinLnBrk="0" hangingPunct="1">
+              <a:spcBef>
+                <a:spcPts val="1000"/>
+              </a:spcBef>
+              <a:spcAft>
+                <a:spcPts val="0"/>
+              </a:spcAft>
+              <a:buClr>
+                <a:schemeClr val="accent1"/>
+              </a:buClr>
+              <a:buSzPct val="80000"/>
+              <a:buFont typeface="Wingdings 3" charset="2"/>
+              <a:buNone/>
+              <a:defRPr sz="1200" kern="1200">
+                <a:solidFill>
+                  <a:schemeClr val="tx1">
+                    <a:tint val="75000"/>
+                  </a:schemeClr>
+                </a:solidFill>
+                <a:latin typeface="+mn-lt"/>
+                <a:ea typeface="+mn-ea"/>
+                <a:cs typeface="+mn-cs"/>
+              </a:defRPr>
+            </a:lvl8pPr>
+            <a:lvl9pPr marL="3657600" indent="0" algn="ctr" defTabSz="457200" rtl="0" eaLnBrk="1" latinLnBrk="0" hangingPunct="1">
+              <a:spcBef>
+                <a:spcPts val="1000"/>
+              </a:spcBef>
+              <a:spcAft>
+                <a:spcPts val="0"/>
+              </a:spcAft>
+              <a:buClr>
+                <a:schemeClr val="accent1"/>
+              </a:buClr>
+              <a:buSzPct val="80000"/>
+              <a:buFont typeface="Wingdings 3" charset="2"/>
+              <a:buNone/>
+              <a:defRPr sz="1200" kern="1200">
+                <a:solidFill>
+                  <a:schemeClr val="tx1">
+                    <a:tint val="75000"/>
+                  </a:schemeClr>
+                </a:solidFill>
+                <a:latin typeface="+mn-lt"/>
+                <a:ea typeface="+mn-ea"/>
+                <a:cs typeface="+mn-cs"/>
+              </a:defRPr>
+            </a:lvl9pPr>
+          </a:lstStyle>
+          <a:p>
+            <a:r>
+              <a:rPr lang="en-US" dirty="0"/>
+              <a:t>Link to presentation, code, dataset and data generator: </a:t>
+            </a:r>
+          </a:p>
+          <a:p>
+            <a:r>
+              <a:rPr lang="en-US" dirty="0">
+                <a:hlinkClick r:id="rId2"/>
+              </a:rPr>
+              <a:t>https://github.com/mihransimonian/Uva-Block3-Big_Data-Assignment</a:t>
+            </a:r>
+            <a:endParaRPr lang="en-US" dirty="0"/>
+          </a:p>
+        </p:txBody>
+      </p:sp>
+    </p:spTree>
+    <p:extLst>
+      <p:ext uri="{BB962C8B-B14F-4D97-AF65-F5344CB8AC3E}">
+        <p14:creationId xmlns:p14="http://schemas.microsoft.com/office/powerpoint/2010/main" val="3395130356"/>
+      </p:ext>
+    </p:extLst>
+  </p:cSld>
+  <p:clrMapOvr>
+    <a:masterClrMapping/>
+  </p:clrMapOvr>
+</p:sld>
+</file>
+
+<file path=ppt/slides/slide24.xml><?xml version="1.0" encoding="utf-8"?>
+<p:sld xmlns:a="http://schemas.openxmlformats.org/drawingml/2006/main" xmlns:r="http://schemas.openxmlformats.org/officeDocument/2006/relationships" xmlns:p="http://schemas.openxmlformats.org/presentationml/2006/main">
+  <p:cSld>
+    <p:spTree>
+      <p:nvGrpSpPr>
+        <p:cNvPr id="1" name=""/>
+        <p:cNvGrpSpPr/>
+        <p:nvPr/>
+      </p:nvGrpSpPr>
+      <p:grpSpPr>
+        <a:xfrm>
+          <a:off x="0" y="0"/>
+          <a:ext cx="0" cy="0"/>
+          <a:chOff x="0" y="0"/>
+          <a:chExt cx="0" cy="0"/>
+        </a:xfrm>
+      </p:grpSpPr>
+      <p:sp>
+        <p:nvSpPr>
+          <p:cNvPr id="2" name="Title 1">
+            <a:extLst>
+              <a:ext uri="{FF2B5EF4-FFF2-40B4-BE49-F238E27FC236}">
+                <a16:creationId xmlns:a16="http://schemas.microsoft.com/office/drawing/2014/main" id="{E2D5BA66-3210-4E08-BF94-0B89CFD35086}"/>
+              </a:ext>
+            </a:extLst>
+          </p:cNvPr>
+          <p:cNvSpPr>
+            <a:spLocks noGrp="1"/>
+          </p:cNvSpPr>
+          <p:nvPr>
+            <p:ph type="title"/>
+          </p:nvPr>
+        </p:nvSpPr>
+        <p:spPr/>
+        <p:txBody>
+          <a:bodyPr/>
+          <a:lstStyle/>
+          <a:p>
+            <a:r>
+              <a:rPr lang="en-US" dirty="0"/>
+              <a:t>Upscaling To Big Data - Storage</a:t>
+            </a:r>
+          </a:p>
+        </p:txBody>
+      </p:sp>
+      <p:sp>
+        <p:nvSpPr>
+          <p:cNvPr id="3" name="Content Placeholder 2">
+            <a:extLst>
+              <a:ext uri="{FF2B5EF4-FFF2-40B4-BE49-F238E27FC236}">
+                <a16:creationId xmlns:a16="http://schemas.microsoft.com/office/drawing/2014/main" id="{79832D4C-B6C5-462C-8C0A-2C94E22E9E71}"/>
+              </a:ext>
+            </a:extLst>
+          </p:cNvPr>
+          <p:cNvSpPr>
+            <a:spLocks noGrp="1"/>
+          </p:cNvSpPr>
+          <p:nvPr>
+            <p:ph idx="1"/>
+          </p:nvPr>
+        </p:nvSpPr>
+        <p:spPr/>
+        <p:txBody>
+          <a:bodyPr>
+            <a:normAutofit/>
+          </a:bodyPr>
+          <a:lstStyle/>
+          <a:p>
+            <a:r>
+              <a:rPr lang="en-US" dirty="0"/>
+              <a:t>Pandas </a:t>
+            </a:r>
+            <a:r>
+              <a:rPr lang="en-US" dirty="0" err="1"/>
+              <a:t>Dataframe</a:t>
+            </a:r>
+            <a:r>
+              <a:rPr lang="en-US" dirty="0"/>
+              <a:t> offers storage to popular formats:</a:t>
+            </a:r>
+          </a:p>
+          <a:p>
+            <a:pPr lvl="1"/>
+            <a:r>
+              <a:rPr lang="en-US" dirty="0"/>
+              <a:t>CSV</a:t>
+            </a:r>
+          </a:p>
+          <a:p>
+            <a:pPr lvl="1"/>
+            <a:r>
+              <a:rPr lang="en-US" dirty="0"/>
+              <a:t>SQL</a:t>
+            </a:r>
+          </a:p>
+          <a:p>
+            <a:pPr lvl="1"/>
+            <a:r>
+              <a:rPr lang="en-US" dirty="0" err="1"/>
+              <a:t>Hdf</a:t>
+            </a:r>
+            <a:endParaRPr lang="en-US" dirty="0"/>
+          </a:p>
+          <a:p>
+            <a:pPr lvl="1"/>
+            <a:r>
+              <a:rPr lang="en-US" dirty="0"/>
+              <a:t>Parquet</a:t>
+            </a:r>
+          </a:p>
+          <a:p>
+            <a:pPr lvl="1"/>
+            <a:r>
+              <a:rPr lang="en-US" dirty="0"/>
+              <a:t>Feather</a:t>
+            </a:r>
+            <a:br>
+              <a:rPr lang="en-US" dirty="0"/>
+            </a:br>
+            <a:endParaRPr lang="en-US" dirty="0"/>
+          </a:p>
+          <a:p>
+            <a:r>
+              <a:rPr lang="en-US" dirty="0"/>
+              <a:t>CSV: ~11 MB</a:t>
+            </a:r>
+          </a:p>
+          <a:p>
+            <a:r>
+              <a:rPr lang="en-US" dirty="0"/>
+              <a:t>Parquet (compression: 5): ~3 MB</a:t>
+            </a:r>
+          </a:p>
+          <a:p>
+            <a:r>
+              <a:rPr lang="en-US" dirty="0"/>
+              <a:t>Further compression (zip, </a:t>
+            </a:r>
+            <a:r>
+              <a:rPr lang="en-US" dirty="0" err="1"/>
+              <a:t>gzip</a:t>
+            </a:r>
+            <a:r>
+              <a:rPr lang="en-US" dirty="0"/>
+              <a:t> etc.) possible</a:t>
+            </a:r>
+          </a:p>
+        </p:txBody>
+      </p:sp>
+    </p:spTree>
+    <p:extLst>
+      <p:ext uri="{BB962C8B-B14F-4D97-AF65-F5344CB8AC3E}">
+        <p14:creationId xmlns:p14="http://schemas.microsoft.com/office/powerpoint/2010/main" val="2102687898"/>
+      </p:ext>
+    </p:extLst>
+  </p:cSld>
+  <p:clrMapOvr>
+    <a:masterClrMapping/>
+  </p:clrMapOvr>
+</p:sld>
+</file>
+
+<file path=ppt/slides/slide25.xml><?xml version="1.0" encoding="utf-8"?>
+<p:sld xmlns:a="http://schemas.openxmlformats.org/drawingml/2006/main" xmlns:r="http://schemas.openxmlformats.org/officeDocument/2006/relationships" xmlns:p="http://schemas.openxmlformats.org/presentationml/2006/main">
+  <p:cSld>
+    <p:spTree>
+      <p:nvGrpSpPr>
+        <p:cNvPr id="1" name=""/>
+        <p:cNvGrpSpPr/>
+        <p:nvPr/>
+      </p:nvGrpSpPr>
+      <p:grpSpPr>
+        <a:xfrm>
+          <a:off x="0" y="0"/>
+          <a:ext cx="0" cy="0"/>
+          <a:chOff x="0" y="0"/>
+          <a:chExt cx="0" cy="0"/>
+        </a:xfrm>
+      </p:grpSpPr>
+      <p:sp>
+        <p:nvSpPr>
+          <p:cNvPr id="2" name="Title 1">
+            <a:extLst>
+              <a:ext uri="{FF2B5EF4-FFF2-40B4-BE49-F238E27FC236}">
+                <a16:creationId xmlns:a16="http://schemas.microsoft.com/office/drawing/2014/main" id="{E2D5BA66-3210-4E08-BF94-0B89CFD35086}"/>
+              </a:ext>
+            </a:extLst>
+          </p:cNvPr>
+          <p:cNvSpPr>
+            <a:spLocks noGrp="1"/>
+          </p:cNvSpPr>
+          <p:nvPr>
+            <p:ph type="title"/>
+          </p:nvPr>
+        </p:nvSpPr>
+        <p:spPr/>
+        <p:txBody>
+          <a:bodyPr/>
+          <a:lstStyle/>
+          <a:p>
+            <a:r>
+              <a:rPr lang="en-US" dirty="0"/>
+              <a:t>Upscaling To Big Data - Processing</a:t>
+            </a:r>
+          </a:p>
+        </p:txBody>
+      </p:sp>
+      <p:sp>
+        <p:nvSpPr>
+          <p:cNvPr id="3" name="Content Placeholder 2">
+            <a:extLst>
+              <a:ext uri="{FF2B5EF4-FFF2-40B4-BE49-F238E27FC236}">
+                <a16:creationId xmlns:a16="http://schemas.microsoft.com/office/drawing/2014/main" id="{79832D4C-B6C5-462C-8C0A-2C94E22E9E71}"/>
+              </a:ext>
+            </a:extLst>
+          </p:cNvPr>
+          <p:cNvSpPr>
+            <a:spLocks noGrp="1"/>
+          </p:cNvSpPr>
+          <p:nvPr>
+            <p:ph idx="1"/>
+          </p:nvPr>
+        </p:nvSpPr>
+        <p:spPr/>
+        <p:txBody>
+          <a:bodyPr>
+            <a:normAutofit fontScale="85000" lnSpcReduction="20000"/>
+          </a:bodyPr>
+          <a:lstStyle/>
+          <a:p>
+            <a:r>
+              <a:rPr lang="en-US" dirty="0"/>
+              <a:t>Using variable translation lists and databases, only functions need to be copied to individual nodes</a:t>
+            </a:r>
+          </a:p>
+          <a:p>
+            <a:endParaRPr lang="en-US" dirty="0"/>
+          </a:p>
+          <a:p>
+            <a:r>
+              <a:rPr lang="en-US" dirty="0"/>
+              <a:t>Relatively simple and self contained functions</a:t>
+            </a:r>
+          </a:p>
+          <a:p>
+            <a:endParaRPr lang="en-US" dirty="0"/>
+          </a:p>
+          <a:p>
+            <a:r>
+              <a:rPr lang="en-US" dirty="0"/>
+              <a:t>Parallelization is therefore easily possible, even without the need of using advanced techniques</a:t>
+            </a:r>
+          </a:p>
+          <a:p>
+            <a:endParaRPr lang="en-US" dirty="0"/>
+          </a:p>
+          <a:p>
+            <a:r>
+              <a:rPr lang="en-US" dirty="0"/>
+              <a:t>The whole import and transformation process can run on a single node</a:t>
+            </a:r>
+          </a:p>
+          <a:p>
+            <a:endParaRPr lang="en-US" dirty="0"/>
+          </a:p>
+          <a:p>
+            <a:r>
+              <a:rPr lang="en-US" dirty="0"/>
+              <a:t>A network of nodes can process multiple new supplier databases</a:t>
+            </a:r>
+          </a:p>
+          <a:p>
+            <a:endParaRPr lang="en-US" dirty="0"/>
+          </a:p>
+          <a:p>
+            <a:r>
+              <a:rPr lang="en-US" dirty="0"/>
+              <a:t>Merging to an existing database depends on the applied techniques</a:t>
+            </a:r>
+          </a:p>
+          <a:p>
+            <a:endParaRPr lang="en-US" dirty="0"/>
+          </a:p>
+        </p:txBody>
+      </p:sp>
+    </p:spTree>
+    <p:extLst>
+      <p:ext uri="{BB962C8B-B14F-4D97-AF65-F5344CB8AC3E}">
+        <p14:creationId xmlns:p14="http://schemas.microsoft.com/office/powerpoint/2010/main" val="676187207"/>
+      </p:ext>
+    </p:extLst>
+  </p:cSld>
+  <p:clrMapOvr>
+    <a:masterClrMapping/>
+  </p:clrMapOvr>
+</p:sld>
+</file>
+
 <file path=ppt/slides/slide26.xml><?xml version="1.0" encoding="utf-8"?>
 <p:sld xmlns:a="http://schemas.openxmlformats.org/drawingml/2006/main" xmlns:r="http://schemas.openxmlformats.org/officeDocument/2006/relationships" xmlns:p="http://schemas.openxmlformats.org/presentationml/2006/main">
   <p:cSld>
@@ -9196,7 +9876,7 @@
             <a:pPr algn="ctr"/>
             <a:r>
               <a:rPr lang="en-US" dirty="0"/>
-              <a:t>Upscaling To Big Data</a:t>
+              <a:t>Conclusion</a:t>
             </a:r>
           </a:p>
         </p:txBody>
@@ -9226,10 +9906,273 @@
           </a:p>
         </p:txBody>
       </p:sp>
+      <p:sp>
+        <p:nvSpPr>
+          <p:cNvPr id="4" name="Text Placeholder 2">
+            <a:extLst>
+              <a:ext uri="{FF2B5EF4-FFF2-40B4-BE49-F238E27FC236}">
+                <a16:creationId xmlns:a16="http://schemas.microsoft.com/office/drawing/2014/main" id="{3E5061F8-DAB1-467E-A169-141D234F003F}"/>
+              </a:ext>
+            </a:extLst>
+          </p:cNvPr>
+          <p:cNvSpPr txBox="1">
+            <a:spLocks/>
+          </p:cNvSpPr>
+          <p:nvPr/>
+        </p:nvSpPr>
+        <p:spPr>
+          <a:xfrm>
+            <a:off x="677335" y="5697135"/>
+            <a:ext cx="8596668" cy="860400"/>
+          </a:xfrm>
+          <a:prstGeom prst="rect">
+            <a:avLst/>
+          </a:prstGeom>
+        </p:spPr>
+        <p:txBody>
+          <a:bodyPr vert="horz" lIns="91440" tIns="45720" rIns="91440" bIns="45720" rtlCol="0" anchor="t">
+            <a:normAutofit/>
+          </a:bodyPr>
+          <a:lstStyle>
+            <a:lvl1pPr marL="0" indent="0" algn="r" defTabSz="457200" rtl="0" eaLnBrk="1" latinLnBrk="0" hangingPunct="1">
+              <a:spcBef>
+                <a:spcPts val="1000"/>
+              </a:spcBef>
+              <a:spcAft>
+                <a:spcPts val="0"/>
+              </a:spcAft>
+              <a:buClr>
+                <a:schemeClr val="accent1"/>
+              </a:buClr>
+              <a:buSzPct val="80000"/>
+              <a:buFont typeface="Wingdings 3" charset="2"/>
+              <a:buNone/>
+              <a:defRPr sz="1800" kern="1200">
+                <a:solidFill>
+                  <a:schemeClr val="tx1">
+                    <a:lumMod val="50000"/>
+                    <a:lumOff val="50000"/>
+                  </a:schemeClr>
+                </a:solidFill>
+                <a:latin typeface="+mn-lt"/>
+                <a:ea typeface="+mn-ea"/>
+                <a:cs typeface="+mn-cs"/>
+              </a:defRPr>
+            </a:lvl1pPr>
+            <a:lvl2pPr marL="457200" indent="0" algn="ctr" defTabSz="457200" rtl="0" eaLnBrk="1" latinLnBrk="0" hangingPunct="1">
+              <a:spcBef>
+                <a:spcPts val="1000"/>
+              </a:spcBef>
+              <a:spcAft>
+                <a:spcPts val="0"/>
+              </a:spcAft>
+              <a:buClr>
+                <a:schemeClr val="accent1"/>
+              </a:buClr>
+              <a:buSzPct val="80000"/>
+              <a:buFont typeface="Wingdings 3" charset="2"/>
+              <a:buNone/>
+              <a:defRPr sz="1600" kern="1200">
+                <a:solidFill>
+                  <a:schemeClr val="tx1">
+                    <a:tint val="75000"/>
+                  </a:schemeClr>
+                </a:solidFill>
+                <a:latin typeface="+mn-lt"/>
+                <a:ea typeface="+mn-ea"/>
+                <a:cs typeface="+mn-cs"/>
+              </a:defRPr>
+            </a:lvl2pPr>
+            <a:lvl3pPr marL="914400" indent="0" algn="ctr" defTabSz="457200" rtl="0" eaLnBrk="1" latinLnBrk="0" hangingPunct="1">
+              <a:spcBef>
+                <a:spcPts val="1000"/>
+              </a:spcBef>
+              <a:spcAft>
+                <a:spcPts val="0"/>
+              </a:spcAft>
+              <a:buClr>
+                <a:schemeClr val="accent1"/>
+              </a:buClr>
+              <a:buSzPct val="80000"/>
+              <a:buFont typeface="Wingdings 3" charset="2"/>
+              <a:buNone/>
+              <a:defRPr sz="1400" kern="1200">
+                <a:solidFill>
+                  <a:schemeClr val="tx1">
+                    <a:tint val="75000"/>
+                  </a:schemeClr>
+                </a:solidFill>
+                <a:latin typeface="+mn-lt"/>
+                <a:ea typeface="+mn-ea"/>
+                <a:cs typeface="+mn-cs"/>
+              </a:defRPr>
+            </a:lvl3pPr>
+            <a:lvl4pPr marL="1371600" indent="0" algn="ctr" defTabSz="457200" rtl="0" eaLnBrk="1" latinLnBrk="0" hangingPunct="1">
+              <a:spcBef>
+                <a:spcPts val="1000"/>
+              </a:spcBef>
+              <a:spcAft>
+                <a:spcPts val="0"/>
+              </a:spcAft>
+              <a:buClr>
+                <a:schemeClr val="accent1"/>
+              </a:buClr>
+              <a:buSzPct val="80000"/>
+              <a:buFont typeface="Wingdings 3" charset="2"/>
+              <a:buNone/>
+              <a:defRPr sz="1200" kern="1200">
+                <a:solidFill>
+                  <a:schemeClr val="tx1">
+                    <a:tint val="75000"/>
+                  </a:schemeClr>
+                </a:solidFill>
+                <a:latin typeface="+mn-lt"/>
+                <a:ea typeface="+mn-ea"/>
+                <a:cs typeface="+mn-cs"/>
+              </a:defRPr>
+            </a:lvl4pPr>
+            <a:lvl5pPr marL="1828800" indent="0" algn="ctr" defTabSz="457200" rtl="0" eaLnBrk="1" latinLnBrk="0" hangingPunct="1">
+              <a:spcBef>
+                <a:spcPts val="1000"/>
+              </a:spcBef>
+              <a:spcAft>
+                <a:spcPts val="0"/>
+              </a:spcAft>
+              <a:buClr>
+                <a:schemeClr val="accent1"/>
+              </a:buClr>
+              <a:buSzPct val="80000"/>
+              <a:buFont typeface="Wingdings 3" charset="2"/>
+              <a:buNone/>
+              <a:defRPr sz="1200" kern="1200">
+                <a:solidFill>
+                  <a:schemeClr val="tx1">
+                    <a:tint val="75000"/>
+                  </a:schemeClr>
+                </a:solidFill>
+                <a:latin typeface="+mn-lt"/>
+                <a:ea typeface="+mn-ea"/>
+                <a:cs typeface="+mn-cs"/>
+              </a:defRPr>
+            </a:lvl5pPr>
+            <a:lvl6pPr marL="2286000" indent="0" algn="ctr" defTabSz="457200" rtl="0" eaLnBrk="1" latinLnBrk="0" hangingPunct="1">
+              <a:spcBef>
+                <a:spcPts val="1000"/>
+              </a:spcBef>
+              <a:spcAft>
+                <a:spcPts val="0"/>
+              </a:spcAft>
+              <a:buClr>
+                <a:schemeClr val="accent1"/>
+              </a:buClr>
+              <a:buSzPct val="80000"/>
+              <a:buFont typeface="Wingdings 3" charset="2"/>
+              <a:buNone/>
+              <a:defRPr sz="1200" kern="1200">
+                <a:solidFill>
+                  <a:schemeClr val="tx1">
+                    <a:tint val="75000"/>
+                  </a:schemeClr>
+                </a:solidFill>
+                <a:latin typeface="+mn-lt"/>
+                <a:ea typeface="+mn-ea"/>
+                <a:cs typeface="+mn-cs"/>
+              </a:defRPr>
+            </a:lvl6pPr>
+            <a:lvl7pPr marL="2743200" indent="0" algn="ctr" defTabSz="457200" rtl="0" eaLnBrk="1" latinLnBrk="0" hangingPunct="1">
+              <a:spcBef>
+                <a:spcPts val="1000"/>
+              </a:spcBef>
+              <a:spcAft>
+                <a:spcPts val="0"/>
+              </a:spcAft>
+              <a:buClr>
+                <a:schemeClr val="accent1"/>
+              </a:buClr>
+              <a:buSzPct val="80000"/>
+              <a:buFont typeface="Wingdings 3" charset="2"/>
+              <a:buNone/>
+              <a:defRPr sz="1200" kern="1200">
+                <a:solidFill>
+                  <a:schemeClr val="tx1">
+                    <a:tint val="75000"/>
+                  </a:schemeClr>
+                </a:solidFill>
+                <a:latin typeface="+mn-lt"/>
+                <a:ea typeface="+mn-ea"/>
+                <a:cs typeface="+mn-cs"/>
+              </a:defRPr>
+            </a:lvl7pPr>
+            <a:lvl8pPr marL="3200400" indent="0" algn="ctr" defTabSz="457200" rtl="0" eaLnBrk="1" latinLnBrk="0" hangingPunct="1">
+              <a:spcBef>
+                <a:spcPts val="1000"/>
+              </a:spcBef>
+              <a:spcAft>
+                <a:spcPts val="0"/>
+              </a:spcAft>
+              <a:buClr>
+                <a:schemeClr val="accent1"/>
+              </a:buClr>
+              <a:buSzPct val="80000"/>
+              <a:buFont typeface="Wingdings 3" charset="2"/>
+              <a:buNone/>
+              <a:defRPr sz="1200" kern="1200">
+                <a:solidFill>
+                  <a:schemeClr val="tx1">
+                    <a:tint val="75000"/>
+                  </a:schemeClr>
+                </a:solidFill>
+                <a:latin typeface="+mn-lt"/>
+                <a:ea typeface="+mn-ea"/>
+                <a:cs typeface="+mn-cs"/>
+              </a:defRPr>
+            </a:lvl8pPr>
+            <a:lvl9pPr marL="3657600" indent="0" algn="ctr" defTabSz="457200" rtl="0" eaLnBrk="1" latinLnBrk="0" hangingPunct="1">
+              <a:spcBef>
+                <a:spcPts val="1000"/>
+              </a:spcBef>
+              <a:spcAft>
+                <a:spcPts val="0"/>
+              </a:spcAft>
+              <a:buClr>
+                <a:schemeClr val="accent1"/>
+              </a:buClr>
+              <a:buSzPct val="80000"/>
+              <a:buFont typeface="Wingdings 3" charset="2"/>
+              <a:buNone/>
+              <a:defRPr sz="1200" kern="1200">
+                <a:solidFill>
+                  <a:schemeClr val="tx1">
+                    <a:tint val="75000"/>
+                  </a:schemeClr>
+                </a:solidFill>
+                <a:latin typeface="+mn-lt"/>
+                <a:ea typeface="+mn-ea"/>
+                <a:cs typeface="+mn-cs"/>
+              </a:defRPr>
+            </a:lvl9pPr>
+          </a:lstStyle>
+          <a:p>
+            <a:r>
+              <a:rPr lang="en-US" dirty="0"/>
+              <a:t>Link to presentation, code, dataset and data generator: </a:t>
+            </a:r>
+          </a:p>
+          <a:p>
+            <a:r>
+              <a:rPr lang="en-US" dirty="0">
+                <a:hlinkClick r:id="rId2"/>
+              </a:rPr>
+              <a:t>https://github.com/mihransimonian/Uva-Block3-Big_Data-Assignment</a:t>
+            </a:r>
+            <a:endParaRPr lang="en-US" dirty="0"/>
+          </a:p>
+        </p:txBody>
+      </p:sp>
     </p:spTree>
     <p:extLst>
       <p:ext uri="{BB962C8B-B14F-4D97-AF65-F5344CB8AC3E}">
-        <p14:creationId xmlns:p14="http://schemas.microsoft.com/office/powerpoint/2010/main" val="3395130356"/>
+        <p14:creationId xmlns:p14="http://schemas.microsoft.com/office/powerpoint/2010/main" val="1962078119"/>
       </p:ext>
     </p:extLst>
   </p:cSld>
@@ -9279,7 +10222,7 @@
           <a:p>
             <a:r>
               <a:rPr lang="en-US" dirty="0"/>
-              <a:t>Upscaling To Big Data - Storage</a:t>
+              <a:t>Conclusion – A Very Unique System</a:t>
             </a:r>
           </a:p>
         </p:txBody>
@@ -9303,87 +10246,49 @@
         <p:spPr/>
         <p:txBody>
           <a:bodyPr>
-            <a:normAutofit/>
+            <a:normAutofit lnSpcReduction="10000"/>
           </a:bodyPr>
           <a:lstStyle/>
           <a:p>
             <a:r>
               <a:rPr lang="en-US" dirty="0"/>
-              <a:t>Pandas </a:t>
-            </a:r>
-            <a:r>
-              <a:rPr lang="en-US" dirty="0" err="1"/>
-              <a:t>Dataframe</a:t>
-            </a:r>
-            <a:r>
-              <a:rPr lang="en-US" dirty="0"/>
-              <a:t> offers storage to popular formats:</a:t>
-            </a:r>
-          </a:p>
-          <a:p>
-            <a:pPr lvl="1"/>
-            <a:r>
-              <a:rPr lang="en-US" dirty="0"/>
-              <a:t>CSV</a:t>
-            </a:r>
-          </a:p>
-          <a:p>
-            <a:pPr lvl="1"/>
-            <a:r>
-              <a:rPr lang="en-US" dirty="0"/>
-              <a:t>SQL</a:t>
-            </a:r>
-          </a:p>
-          <a:p>
-            <a:pPr lvl="1"/>
-            <a:r>
-              <a:rPr lang="en-US" dirty="0" err="1"/>
-              <a:t>Hdf</a:t>
-            </a:r>
-            <a:endParaRPr lang="en-US" dirty="0"/>
-          </a:p>
-          <a:p>
-            <a:pPr lvl="1"/>
-            <a:r>
-              <a:rPr lang="en-US" dirty="0"/>
-              <a:t>Parquet</a:t>
-            </a:r>
-          </a:p>
-          <a:p>
-            <a:pPr lvl="1"/>
-            <a:r>
-              <a:rPr lang="en-US" dirty="0"/>
-              <a:t>Feather</a:t>
-            </a:r>
-            <a:br>
-              <a:rPr lang="en-US" dirty="0"/>
-            </a:br>
-            <a:endParaRPr lang="en-US" dirty="0"/>
-          </a:p>
-          <a:p>
-            <a:r>
-              <a:rPr lang="en-US" dirty="0"/>
-              <a:t>CSV: ~11 MB</a:t>
-            </a:r>
-          </a:p>
-          <a:p>
-            <a:r>
-              <a:rPr lang="en-US" dirty="0"/>
-              <a:t>Parquet (compression: 5): ~3 MB</a:t>
-            </a:r>
-          </a:p>
-          <a:p>
-            <a:r>
-              <a:rPr lang="en-US" dirty="0"/>
-              <a:t>Further compression (zip, </a:t>
-            </a:r>
-            <a:r>
-              <a:rPr lang="en-US" dirty="0" err="1"/>
-              <a:t>gzip</a:t>
-            </a:r>
-            <a:r>
-              <a:rPr lang="en-US" dirty="0"/>
-              <a:t> etc.) possible</a:t>
+              <a:t>Combine loose files with specific software</a:t>
+            </a:r>
+          </a:p>
+          <a:p>
+            <a:endParaRPr lang="en-US" dirty="0"/>
+          </a:p>
+          <a:p>
+            <a:r>
+              <a:rPr lang="en-US" dirty="0"/>
+              <a:t>By making software as generic as possible, this can be used for many instances</a:t>
+            </a:r>
+          </a:p>
+          <a:p>
+            <a:endParaRPr lang="en-US" dirty="0"/>
+          </a:p>
+          <a:p>
+            <a:r>
+              <a:rPr lang="en-US" dirty="0"/>
+              <a:t>A relative quick system</a:t>
+            </a:r>
+          </a:p>
+          <a:p>
+            <a:endParaRPr lang="en-US" dirty="0"/>
+          </a:p>
+          <a:p>
+            <a:r>
+              <a:rPr lang="en-US" dirty="0"/>
+              <a:t>Universally deployable</a:t>
+            </a:r>
+          </a:p>
+          <a:p>
+            <a:endParaRPr lang="en-US" dirty="0"/>
+          </a:p>
+          <a:p>
+            <a:r>
+              <a:rPr lang="en-US" dirty="0"/>
+              <a:t>Requires little to no additional libraries (depends on storage output, code provides for installation of libraries)</a:t>
             </a:r>
           </a:p>
         </p:txBody>
@@ -9391,7 +10296,7 @@
     </p:spTree>
     <p:extLst>
       <p:ext uri="{BB962C8B-B14F-4D97-AF65-F5344CB8AC3E}">
-        <p14:creationId xmlns:p14="http://schemas.microsoft.com/office/powerpoint/2010/main" val="2102687898"/>
+        <p14:creationId xmlns:p14="http://schemas.microsoft.com/office/powerpoint/2010/main" val="1575429779"/>
       </p:ext>
     </p:extLst>
   </p:cSld>
@@ -9423,7 +10328,7 @@
           <p:cNvPr id="2" name="Title 1">
             <a:extLst>
               <a:ext uri="{FF2B5EF4-FFF2-40B4-BE49-F238E27FC236}">
-                <a16:creationId xmlns:a16="http://schemas.microsoft.com/office/drawing/2014/main" id="{E2D5BA66-3210-4E08-BF94-0B89CFD35086}"/>
+                <a16:creationId xmlns:a16="http://schemas.microsoft.com/office/drawing/2014/main" id="{B28018A3-3CE5-4418-8CF8-15522FB0C656}"/>
               </a:ext>
             </a:extLst>
           </p:cNvPr>
@@ -9439,19 +10344,20 @@
           <a:bodyPr/>
           <a:lstStyle/>
           <a:p>
-            <a:r>
-              <a:rPr lang="en-US" dirty="0"/>
-              <a:t>Upscaling To Big Data - Processing</a:t>
-            </a:r>
-          </a:p>
-        </p:txBody>
-      </p:sp>
-      <p:sp>
-        <p:nvSpPr>
-          <p:cNvPr id="3" name="Content Placeholder 2">
+            <a:pPr algn="ctr"/>
+            <a:r>
+              <a:rPr lang="en-US" dirty="0"/>
+              <a:t>Discussion</a:t>
+            </a:r>
+          </a:p>
+        </p:txBody>
+      </p:sp>
+      <p:sp>
+        <p:nvSpPr>
+          <p:cNvPr id="3" name="Text Placeholder 2">
             <a:extLst>
               <a:ext uri="{FF2B5EF4-FFF2-40B4-BE49-F238E27FC236}">
-                <a16:creationId xmlns:a16="http://schemas.microsoft.com/office/drawing/2014/main" id="{79832D4C-B6C5-462C-8C0A-2C94E22E9E71}"/>
+                <a16:creationId xmlns:a16="http://schemas.microsoft.com/office/drawing/2014/main" id="{7E3B1D62-302E-4E1B-B440-3F5B16CA1A4C}"/>
               </a:ext>
             </a:extLst>
           </p:cNvPr>
@@ -9459,67 +10365,277 @@
             <a:spLocks noGrp="1"/>
           </p:cNvSpPr>
           <p:nvPr>
-            <p:ph idx="1"/>
+            <p:ph type="body" idx="1"/>
           </p:nvPr>
         </p:nvSpPr>
         <p:spPr/>
         <p:txBody>
-          <a:bodyPr>
-            <a:normAutofit fontScale="85000" lnSpcReduction="20000"/>
+          <a:bodyPr/>
+          <a:lstStyle/>
+          <a:p>
+            <a:endParaRPr lang="en-US"/>
+          </a:p>
+        </p:txBody>
+      </p:sp>
+      <p:sp>
+        <p:nvSpPr>
+          <p:cNvPr id="4" name="Text Placeholder 2">
+            <a:extLst>
+              <a:ext uri="{FF2B5EF4-FFF2-40B4-BE49-F238E27FC236}">
+                <a16:creationId xmlns:a16="http://schemas.microsoft.com/office/drawing/2014/main" id="{4349F89A-041E-4A90-B006-4CE3843B0956}"/>
+              </a:ext>
+            </a:extLst>
+          </p:cNvPr>
+          <p:cNvSpPr txBox="1">
+            <a:spLocks/>
+          </p:cNvSpPr>
+          <p:nvPr/>
+        </p:nvSpPr>
+        <p:spPr>
+          <a:xfrm>
+            <a:off x="677335" y="5697135"/>
+            <a:ext cx="8596668" cy="860400"/>
+          </a:xfrm>
+          <a:prstGeom prst="rect">
+            <a:avLst/>
+          </a:prstGeom>
+        </p:spPr>
+        <p:txBody>
+          <a:bodyPr vert="horz" lIns="91440" tIns="45720" rIns="91440" bIns="45720" rtlCol="0" anchor="t">
+            <a:normAutofit/>
           </a:bodyPr>
-          <a:lstStyle/>
-          <a:p>
-            <a:r>
-              <a:rPr lang="en-US" dirty="0"/>
-              <a:t>Using variable translation lists and databases, only functions need to be copied to individual nodes</a:t>
-            </a:r>
-          </a:p>
-          <a:p>
-            <a:endParaRPr lang="en-US" dirty="0"/>
-          </a:p>
-          <a:p>
-            <a:r>
-              <a:rPr lang="en-US" dirty="0"/>
-              <a:t>Relatively simple and self contained functions</a:t>
-            </a:r>
-          </a:p>
-          <a:p>
-            <a:endParaRPr lang="en-US" dirty="0"/>
-          </a:p>
-          <a:p>
-            <a:r>
-              <a:rPr lang="en-US" dirty="0"/>
-              <a:t>Parallelization is therefore easily possible, even without the need of using advanced techniques</a:t>
-            </a:r>
-          </a:p>
-          <a:p>
-            <a:endParaRPr lang="en-US" dirty="0"/>
-          </a:p>
-          <a:p>
-            <a:r>
-              <a:rPr lang="en-US" dirty="0"/>
-              <a:t>The whole import and transformation process can run on a single node</a:t>
-            </a:r>
-          </a:p>
-          <a:p>
-            <a:endParaRPr lang="en-US" dirty="0"/>
-          </a:p>
-          <a:p>
-            <a:r>
-              <a:rPr lang="en-US" dirty="0"/>
-              <a:t>A network of nodes can process multiple new supplier databases</a:t>
-            </a:r>
-          </a:p>
-          <a:p>
-            <a:endParaRPr lang="en-US" dirty="0"/>
-          </a:p>
-          <a:p>
-            <a:r>
-              <a:rPr lang="en-US" dirty="0"/>
-              <a:t>Merging to an existing database depends on the applied techniques</a:t>
-            </a:r>
-          </a:p>
-          <a:p>
+          <a:lstStyle>
+            <a:lvl1pPr marL="0" indent="0" algn="r" defTabSz="457200" rtl="0" eaLnBrk="1" latinLnBrk="0" hangingPunct="1">
+              <a:spcBef>
+                <a:spcPts val="1000"/>
+              </a:spcBef>
+              <a:spcAft>
+                <a:spcPts val="0"/>
+              </a:spcAft>
+              <a:buClr>
+                <a:schemeClr val="accent1"/>
+              </a:buClr>
+              <a:buSzPct val="80000"/>
+              <a:buFont typeface="Wingdings 3" charset="2"/>
+              <a:buNone/>
+              <a:defRPr sz="1800" kern="1200">
+                <a:solidFill>
+                  <a:schemeClr val="tx1">
+                    <a:lumMod val="50000"/>
+                    <a:lumOff val="50000"/>
+                  </a:schemeClr>
+                </a:solidFill>
+                <a:latin typeface="+mn-lt"/>
+                <a:ea typeface="+mn-ea"/>
+                <a:cs typeface="+mn-cs"/>
+              </a:defRPr>
+            </a:lvl1pPr>
+            <a:lvl2pPr marL="457200" indent="0" algn="ctr" defTabSz="457200" rtl="0" eaLnBrk="1" latinLnBrk="0" hangingPunct="1">
+              <a:spcBef>
+                <a:spcPts val="1000"/>
+              </a:spcBef>
+              <a:spcAft>
+                <a:spcPts val="0"/>
+              </a:spcAft>
+              <a:buClr>
+                <a:schemeClr val="accent1"/>
+              </a:buClr>
+              <a:buSzPct val="80000"/>
+              <a:buFont typeface="Wingdings 3" charset="2"/>
+              <a:buNone/>
+              <a:defRPr sz="1600" kern="1200">
+                <a:solidFill>
+                  <a:schemeClr val="tx1">
+                    <a:tint val="75000"/>
+                  </a:schemeClr>
+                </a:solidFill>
+                <a:latin typeface="+mn-lt"/>
+                <a:ea typeface="+mn-ea"/>
+                <a:cs typeface="+mn-cs"/>
+              </a:defRPr>
+            </a:lvl2pPr>
+            <a:lvl3pPr marL="914400" indent="0" algn="ctr" defTabSz="457200" rtl="0" eaLnBrk="1" latinLnBrk="0" hangingPunct="1">
+              <a:spcBef>
+                <a:spcPts val="1000"/>
+              </a:spcBef>
+              <a:spcAft>
+                <a:spcPts val="0"/>
+              </a:spcAft>
+              <a:buClr>
+                <a:schemeClr val="accent1"/>
+              </a:buClr>
+              <a:buSzPct val="80000"/>
+              <a:buFont typeface="Wingdings 3" charset="2"/>
+              <a:buNone/>
+              <a:defRPr sz="1400" kern="1200">
+                <a:solidFill>
+                  <a:schemeClr val="tx1">
+                    <a:tint val="75000"/>
+                  </a:schemeClr>
+                </a:solidFill>
+                <a:latin typeface="+mn-lt"/>
+                <a:ea typeface="+mn-ea"/>
+                <a:cs typeface="+mn-cs"/>
+              </a:defRPr>
+            </a:lvl3pPr>
+            <a:lvl4pPr marL="1371600" indent="0" algn="ctr" defTabSz="457200" rtl="0" eaLnBrk="1" latinLnBrk="0" hangingPunct="1">
+              <a:spcBef>
+                <a:spcPts val="1000"/>
+              </a:spcBef>
+              <a:spcAft>
+                <a:spcPts val="0"/>
+              </a:spcAft>
+              <a:buClr>
+                <a:schemeClr val="accent1"/>
+              </a:buClr>
+              <a:buSzPct val="80000"/>
+              <a:buFont typeface="Wingdings 3" charset="2"/>
+              <a:buNone/>
+              <a:defRPr sz="1200" kern="1200">
+                <a:solidFill>
+                  <a:schemeClr val="tx1">
+                    <a:tint val="75000"/>
+                  </a:schemeClr>
+                </a:solidFill>
+                <a:latin typeface="+mn-lt"/>
+                <a:ea typeface="+mn-ea"/>
+                <a:cs typeface="+mn-cs"/>
+              </a:defRPr>
+            </a:lvl4pPr>
+            <a:lvl5pPr marL="1828800" indent="0" algn="ctr" defTabSz="457200" rtl="0" eaLnBrk="1" latinLnBrk="0" hangingPunct="1">
+              <a:spcBef>
+                <a:spcPts val="1000"/>
+              </a:spcBef>
+              <a:spcAft>
+                <a:spcPts val="0"/>
+              </a:spcAft>
+              <a:buClr>
+                <a:schemeClr val="accent1"/>
+              </a:buClr>
+              <a:buSzPct val="80000"/>
+              <a:buFont typeface="Wingdings 3" charset="2"/>
+              <a:buNone/>
+              <a:defRPr sz="1200" kern="1200">
+                <a:solidFill>
+                  <a:schemeClr val="tx1">
+                    <a:tint val="75000"/>
+                  </a:schemeClr>
+                </a:solidFill>
+                <a:latin typeface="+mn-lt"/>
+                <a:ea typeface="+mn-ea"/>
+                <a:cs typeface="+mn-cs"/>
+              </a:defRPr>
+            </a:lvl5pPr>
+            <a:lvl6pPr marL="2286000" indent="0" algn="ctr" defTabSz="457200" rtl="0" eaLnBrk="1" latinLnBrk="0" hangingPunct="1">
+              <a:spcBef>
+                <a:spcPts val="1000"/>
+              </a:spcBef>
+              <a:spcAft>
+                <a:spcPts val="0"/>
+              </a:spcAft>
+              <a:buClr>
+                <a:schemeClr val="accent1"/>
+              </a:buClr>
+              <a:buSzPct val="80000"/>
+              <a:buFont typeface="Wingdings 3" charset="2"/>
+              <a:buNone/>
+              <a:defRPr sz="1200" kern="1200">
+                <a:solidFill>
+                  <a:schemeClr val="tx1">
+                    <a:tint val="75000"/>
+                  </a:schemeClr>
+                </a:solidFill>
+                <a:latin typeface="+mn-lt"/>
+                <a:ea typeface="+mn-ea"/>
+                <a:cs typeface="+mn-cs"/>
+              </a:defRPr>
+            </a:lvl6pPr>
+            <a:lvl7pPr marL="2743200" indent="0" algn="ctr" defTabSz="457200" rtl="0" eaLnBrk="1" latinLnBrk="0" hangingPunct="1">
+              <a:spcBef>
+                <a:spcPts val="1000"/>
+              </a:spcBef>
+              <a:spcAft>
+                <a:spcPts val="0"/>
+              </a:spcAft>
+              <a:buClr>
+                <a:schemeClr val="accent1"/>
+              </a:buClr>
+              <a:buSzPct val="80000"/>
+              <a:buFont typeface="Wingdings 3" charset="2"/>
+              <a:buNone/>
+              <a:defRPr sz="1200" kern="1200">
+                <a:solidFill>
+                  <a:schemeClr val="tx1">
+                    <a:tint val="75000"/>
+                  </a:schemeClr>
+                </a:solidFill>
+                <a:latin typeface="+mn-lt"/>
+                <a:ea typeface="+mn-ea"/>
+                <a:cs typeface="+mn-cs"/>
+              </a:defRPr>
+            </a:lvl7pPr>
+            <a:lvl8pPr marL="3200400" indent="0" algn="ctr" defTabSz="457200" rtl="0" eaLnBrk="1" latinLnBrk="0" hangingPunct="1">
+              <a:spcBef>
+                <a:spcPts val="1000"/>
+              </a:spcBef>
+              <a:spcAft>
+                <a:spcPts val="0"/>
+              </a:spcAft>
+              <a:buClr>
+                <a:schemeClr val="accent1"/>
+              </a:buClr>
+              <a:buSzPct val="80000"/>
+              <a:buFont typeface="Wingdings 3" charset="2"/>
+              <a:buNone/>
+              <a:defRPr sz="1200" kern="1200">
+                <a:solidFill>
+                  <a:schemeClr val="tx1">
+                    <a:tint val="75000"/>
+                  </a:schemeClr>
+                </a:solidFill>
+                <a:latin typeface="+mn-lt"/>
+                <a:ea typeface="+mn-ea"/>
+                <a:cs typeface="+mn-cs"/>
+              </a:defRPr>
+            </a:lvl8pPr>
+            <a:lvl9pPr marL="3657600" indent="0" algn="ctr" defTabSz="457200" rtl="0" eaLnBrk="1" latinLnBrk="0" hangingPunct="1">
+              <a:spcBef>
+                <a:spcPts val="1000"/>
+              </a:spcBef>
+              <a:spcAft>
+                <a:spcPts val="0"/>
+              </a:spcAft>
+              <a:buClr>
+                <a:schemeClr val="accent1"/>
+              </a:buClr>
+              <a:buSzPct val="80000"/>
+              <a:buFont typeface="Wingdings 3" charset="2"/>
+              <a:buNone/>
+              <a:defRPr sz="1200" kern="1200">
+                <a:solidFill>
+                  <a:schemeClr val="tx1">
+                    <a:tint val="75000"/>
+                  </a:schemeClr>
+                </a:solidFill>
+                <a:latin typeface="+mn-lt"/>
+                <a:ea typeface="+mn-ea"/>
+                <a:cs typeface="+mn-cs"/>
+              </a:defRPr>
+            </a:lvl9pPr>
+          </a:lstStyle>
+          <a:p>
+            <a:r>
+              <a:rPr lang="en-US" dirty="0"/>
+              <a:t>Link to presentation, code, dataset and data generator: </a:t>
+            </a:r>
+          </a:p>
+          <a:p>
+            <a:r>
+              <a:rPr lang="en-US" dirty="0">
+                <a:hlinkClick r:id="rId2"/>
+              </a:rPr>
+              <a:t>https://github.com/mihransimonian/Uva-Block3-Big_Data-Assignment</a:t>
+            </a:r>
             <a:endParaRPr lang="en-US" dirty="0"/>
           </a:p>
         </p:txBody>
@@ -9527,7 +10643,7 @@
     </p:spTree>
     <p:extLst>
       <p:ext uri="{BB962C8B-B14F-4D97-AF65-F5344CB8AC3E}">
-        <p14:creationId xmlns:p14="http://schemas.microsoft.com/office/powerpoint/2010/main" val="676187207"/>
+        <p14:creationId xmlns:p14="http://schemas.microsoft.com/office/powerpoint/2010/main" val="3095320331"/>
       </p:ext>
     </p:extLst>
   </p:cSld>
@@ -9559,7 +10675,7 @@
           <p:cNvPr id="2" name="Title 1">
             <a:extLst>
               <a:ext uri="{FF2B5EF4-FFF2-40B4-BE49-F238E27FC236}">
-                <a16:creationId xmlns:a16="http://schemas.microsoft.com/office/drawing/2014/main" id="{B28018A3-3CE5-4418-8CF8-15522FB0C656}"/>
+                <a16:creationId xmlns:a16="http://schemas.microsoft.com/office/drawing/2014/main" id="{E2D5BA66-3210-4E08-BF94-0B89CFD35086}"/>
               </a:ext>
             </a:extLst>
           </p:cNvPr>
@@ -9575,20 +10691,19 @@
           <a:bodyPr/>
           <a:lstStyle/>
           <a:p>
-            <a:pPr algn="ctr"/>
-            <a:r>
-              <a:rPr lang="en-US" dirty="0"/>
-              <a:t>Conclusion</a:t>
-            </a:r>
-          </a:p>
-        </p:txBody>
-      </p:sp>
-      <p:sp>
-        <p:nvSpPr>
-          <p:cNvPr id="3" name="Text Placeholder 2">
+            <a:r>
+              <a:rPr lang="en-US" dirty="0"/>
+              <a:t>Discussion – Humans Remain Involved</a:t>
+            </a:r>
+          </a:p>
+        </p:txBody>
+      </p:sp>
+      <p:sp>
+        <p:nvSpPr>
+          <p:cNvPr id="3" name="Content Placeholder 2">
             <a:extLst>
               <a:ext uri="{FF2B5EF4-FFF2-40B4-BE49-F238E27FC236}">
-                <a16:creationId xmlns:a16="http://schemas.microsoft.com/office/drawing/2014/main" id="{7E3B1D62-302E-4E1B-B440-3F5B16CA1A4C}"/>
+                <a16:creationId xmlns:a16="http://schemas.microsoft.com/office/drawing/2014/main" id="{79832D4C-B6C5-462C-8C0A-2C94E22E9E71}"/>
               </a:ext>
             </a:extLst>
           </p:cNvPr>
@@ -9596,22 +10711,60 @@
             <a:spLocks noGrp="1"/>
           </p:cNvSpPr>
           <p:nvPr>
-            <p:ph type="body" idx="1"/>
+            <p:ph idx="1"/>
           </p:nvPr>
         </p:nvSpPr>
         <p:spPr/>
         <p:txBody>
-          <a:bodyPr/>
-          <a:lstStyle/>
-          <a:p>
-            <a:endParaRPr lang="en-US"/>
+          <a:bodyPr>
+            <a:normAutofit/>
+          </a:bodyPr>
+          <a:lstStyle/>
+          <a:p>
+            <a:r>
+              <a:rPr lang="en-US" dirty="0"/>
+              <a:t>Humans are able to adjust csv files, potentially ruining the system</a:t>
+            </a:r>
+          </a:p>
+          <a:p>
+            <a:endParaRPr lang="en-US" dirty="0"/>
+          </a:p>
+          <a:p>
+            <a:r>
+              <a:rPr lang="en-US" dirty="0"/>
+              <a:t>We will always need a human verification</a:t>
+            </a:r>
+          </a:p>
+          <a:p>
+            <a:endParaRPr lang="en-US" dirty="0"/>
+          </a:p>
+          <a:p>
+            <a:r>
+              <a:rPr lang="en-US" dirty="0"/>
+              <a:t>System was specifically designed to tailor the human side of the conversion; being able to use human’s capabilities in interpreting information and thus assign a new measurement unit system</a:t>
+            </a:r>
+          </a:p>
+          <a:p>
+            <a:endParaRPr lang="en-US" dirty="0"/>
+          </a:p>
+          <a:p>
+            <a:r>
+              <a:rPr lang="en-US" dirty="0"/>
+              <a:t>Security implications as people might create functions that you don’t want to execute (formatting a drive, deleting files etc.)</a:t>
+            </a:r>
+          </a:p>
+          <a:p>
+            <a:endParaRPr lang="en-US" dirty="0"/>
+          </a:p>
+          <a:p>
+            <a:endParaRPr lang="en-US" dirty="0"/>
           </a:p>
         </p:txBody>
       </p:sp>
     </p:spTree>
     <p:extLst>
       <p:ext uri="{BB962C8B-B14F-4D97-AF65-F5344CB8AC3E}">
-        <p14:creationId xmlns:p14="http://schemas.microsoft.com/office/powerpoint/2010/main" val="1962078119"/>
+        <p14:creationId xmlns:p14="http://schemas.microsoft.com/office/powerpoint/2010/main" val="2697133627"/>
       </p:ext>
     </p:extLst>
   </p:cSld>
@@ -9692,6 +10845,269 @@
           </a:p>
         </p:txBody>
       </p:sp>
+      <p:sp>
+        <p:nvSpPr>
+          <p:cNvPr id="4" name="Text Placeholder 2">
+            <a:extLst>
+              <a:ext uri="{FF2B5EF4-FFF2-40B4-BE49-F238E27FC236}">
+                <a16:creationId xmlns:a16="http://schemas.microsoft.com/office/drawing/2014/main" id="{DA44AFE9-DA5B-4AC5-A3CD-3505E1A9CC50}"/>
+              </a:ext>
+            </a:extLst>
+          </p:cNvPr>
+          <p:cNvSpPr txBox="1">
+            <a:spLocks/>
+          </p:cNvSpPr>
+          <p:nvPr/>
+        </p:nvSpPr>
+        <p:spPr>
+          <a:xfrm>
+            <a:off x="677335" y="5697135"/>
+            <a:ext cx="8596668" cy="860400"/>
+          </a:xfrm>
+          <a:prstGeom prst="rect">
+            <a:avLst/>
+          </a:prstGeom>
+        </p:spPr>
+        <p:txBody>
+          <a:bodyPr vert="horz" lIns="91440" tIns="45720" rIns="91440" bIns="45720" rtlCol="0" anchor="t">
+            <a:normAutofit/>
+          </a:bodyPr>
+          <a:lstStyle>
+            <a:lvl1pPr marL="0" indent="0" algn="r" defTabSz="457200" rtl="0" eaLnBrk="1" latinLnBrk="0" hangingPunct="1">
+              <a:spcBef>
+                <a:spcPts val="1000"/>
+              </a:spcBef>
+              <a:spcAft>
+                <a:spcPts val="0"/>
+              </a:spcAft>
+              <a:buClr>
+                <a:schemeClr val="accent1"/>
+              </a:buClr>
+              <a:buSzPct val="80000"/>
+              <a:buFont typeface="Wingdings 3" charset="2"/>
+              <a:buNone/>
+              <a:defRPr sz="1800" kern="1200">
+                <a:solidFill>
+                  <a:schemeClr val="tx1">
+                    <a:lumMod val="50000"/>
+                    <a:lumOff val="50000"/>
+                  </a:schemeClr>
+                </a:solidFill>
+                <a:latin typeface="+mn-lt"/>
+                <a:ea typeface="+mn-ea"/>
+                <a:cs typeface="+mn-cs"/>
+              </a:defRPr>
+            </a:lvl1pPr>
+            <a:lvl2pPr marL="457200" indent="0" algn="ctr" defTabSz="457200" rtl="0" eaLnBrk="1" latinLnBrk="0" hangingPunct="1">
+              <a:spcBef>
+                <a:spcPts val="1000"/>
+              </a:spcBef>
+              <a:spcAft>
+                <a:spcPts val="0"/>
+              </a:spcAft>
+              <a:buClr>
+                <a:schemeClr val="accent1"/>
+              </a:buClr>
+              <a:buSzPct val="80000"/>
+              <a:buFont typeface="Wingdings 3" charset="2"/>
+              <a:buNone/>
+              <a:defRPr sz="1600" kern="1200">
+                <a:solidFill>
+                  <a:schemeClr val="tx1">
+                    <a:tint val="75000"/>
+                  </a:schemeClr>
+                </a:solidFill>
+                <a:latin typeface="+mn-lt"/>
+                <a:ea typeface="+mn-ea"/>
+                <a:cs typeface="+mn-cs"/>
+              </a:defRPr>
+            </a:lvl2pPr>
+            <a:lvl3pPr marL="914400" indent="0" algn="ctr" defTabSz="457200" rtl="0" eaLnBrk="1" latinLnBrk="0" hangingPunct="1">
+              <a:spcBef>
+                <a:spcPts val="1000"/>
+              </a:spcBef>
+              <a:spcAft>
+                <a:spcPts val="0"/>
+              </a:spcAft>
+              <a:buClr>
+                <a:schemeClr val="accent1"/>
+              </a:buClr>
+              <a:buSzPct val="80000"/>
+              <a:buFont typeface="Wingdings 3" charset="2"/>
+              <a:buNone/>
+              <a:defRPr sz="1400" kern="1200">
+                <a:solidFill>
+                  <a:schemeClr val="tx1">
+                    <a:tint val="75000"/>
+                  </a:schemeClr>
+                </a:solidFill>
+                <a:latin typeface="+mn-lt"/>
+                <a:ea typeface="+mn-ea"/>
+                <a:cs typeface="+mn-cs"/>
+              </a:defRPr>
+            </a:lvl3pPr>
+            <a:lvl4pPr marL="1371600" indent="0" algn="ctr" defTabSz="457200" rtl="0" eaLnBrk="1" latinLnBrk="0" hangingPunct="1">
+              <a:spcBef>
+                <a:spcPts val="1000"/>
+              </a:spcBef>
+              <a:spcAft>
+                <a:spcPts val="0"/>
+              </a:spcAft>
+              <a:buClr>
+                <a:schemeClr val="accent1"/>
+              </a:buClr>
+              <a:buSzPct val="80000"/>
+              <a:buFont typeface="Wingdings 3" charset="2"/>
+              <a:buNone/>
+              <a:defRPr sz="1200" kern="1200">
+                <a:solidFill>
+                  <a:schemeClr val="tx1">
+                    <a:tint val="75000"/>
+                  </a:schemeClr>
+                </a:solidFill>
+                <a:latin typeface="+mn-lt"/>
+                <a:ea typeface="+mn-ea"/>
+                <a:cs typeface="+mn-cs"/>
+              </a:defRPr>
+            </a:lvl4pPr>
+            <a:lvl5pPr marL="1828800" indent="0" algn="ctr" defTabSz="457200" rtl="0" eaLnBrk="1" latinLnBrk="0" hangingPunct="1">
+              <a:spcBef>
+                <a:spcPts val="1000"/>
+              </a:spcBef>
+              <a:spcAft>
+                <a:spcPts val="0"/>
+              </a:spcAft>
+              <a:buClr>
+                <a:schemeClr val="accent1"/>
+              </a:buClr>
+              <a:buSzPct val="80000"/>
+              <a:buFont typeface="Wingdings 3" charset="2"/>
+              <a:buNone/>
+              <a:defRPr sz="1200" kern="1200">
+                <a:solidFill>
+                  <a:schemeClr val="tx1">
+                    <a:tint val="75000"/>
+                  </a:schemeClr>
+                </a:solidFill>
+                <a:latin typeface="+mn-lt"/>
+                <a:ea typeface="+mn-ea"/>
+                <a:cs typeface="+mn-cs"/>
+              </a:defRPr>
+            </a:lvl5pPr>
+            <a:lvl6pPr marL="2286000" indent="0" algn="ctr" defTabSz="457200" rtl="0" eaLnBrk="1" latinLnBrk="0" hangingPunct="1">
+              <a:spcBef>
+                <a:spcPts val="1000"/>
+              </a:spcBef>
+              <a:spcAft>
+                <a:spcPts val="0"/>
+              </a:spcAft>
+              <a:buClr>
+                <a:schemeClr val="accent1"/>
+              </a:buClr>
+              <a:buSzPct val="80000"/>
+              <a:buFont typeface="Wingdings 3" charset="2"/>
+              <a:buNone/>
+              <a:defRPr sz="1200" kern="1200">
+                <a:solidFill>
+                  <a:schemeClr val="tx1">
+                    <a:tint val="75000"/>
+                  </a:schemeClr>
+                </a:solidFill>
+                <a:latin typeface="+mn-lt"/>
+                <a:ea typeface="+mn-ea"/>
+                <a:cs typeface="+mn-cs"/>
+              </a:defRPr>
+            </a:lvl6pPr>
+            <a:lvl7pPr marL="2743200" indent="0" algn="ctr" defTabSz="457200" rtl="0" eaLnBrk="1" latinLnBrk="0" hangingPunct="1">
+              <a:spcBef>
+                <a:spcPts val="1000"/>
+              </a:spcBef>
+              <a:spcAft>
+                <a:spcPts val="0"/>
+              </a:spcAft>
+              <a:buClr>
+                <a:schemeClr val="accent1"/>
+              </a:buClr>
+              <a:buSzPct val="80000"/>
+              <a:buFont typeface="Wingdings 3" charset="2"/>
+              <a:buNone/>
+              <a:defRPr sz="1200" kern="1200">
+                <a:solidFill>
+                  <a:schemeClr val="tx1">
+                    <a:tint val="75000"/>
+                  </a:schemeClr>
+                </a:solidFill>
+                <a:latin typeface="+mn-lt"/>
+                <a:ea typeface="+mn-ea"/>
+                <a:cs typeface="+mn-cs"/>
+              </a:defRPr>
+            </a:lvl7pPr>
+            <a:lvl8pPr marL="3200400" indent="0" algn="ctr" defTabSz="457200" rtl="0" eaLnBrk="1" latinLnBrk="0" hangingPunct="1">
+              <a:spcBef>
+                <a:spcPts val="1000"/>
+              </a:spcBef>
+              <a:spcAft>
+                <a:spcPts val="0"/>
+              </a:spcAft>
+              <a:buClr>
+                <a:schemeClr val="accent1"/>
+              </a:buClr>
+              <a:buSzPct val="80000"/>
+              <a:buFont typeface="Wingdings 3" charset="2"/>
+              <a:buNone/>
+              <a:defRPr sz="1200" kern="1200">
+                <a:solidFill>
+                  <a:schemeClr val="tx1">
+                    <a:tint val="75000"/>
+                  </a:schemeClr>
+                </a:solidFill>
+                <a:latin typeface="+mn-lt"/>
+                <a:ea typeface="+mn-ea"/>
+                <a:cs typeface="+mn-cs"/>
+              </a:defRPr>
+            </a:lvl8pPr>
+            <a:lvl9pPr marL="3657600" indent="0" algn="ctr" defTabSz="457200" rtl="0" eaLnBrk="1" latinLnBrk="0" hangingPunct="1">
+              <a:spcBef>
+                <a:spcPts val="1000"/>
+              </a:spcBef>
+              <a:spcAft>
+                <a:spcPts val="0"/>
+              </a:spcAft>
+              <a:buClr>
+                <a:schemeClr val="accent1"/>
+              </a:buClr>
+              <a:buSzPct val="80000"/>
+              <a:buFont typeface="Wingdings 3" charset="2"/>
+              <a:buNone/>
+              <a:defRPr sz="1200" kern="1200">
+                <a:solidFill>
+                  <a:schemeClr val="tx1">
+                    <a:tint val="75000"/>
+                  </a:schemeClr>
+                </a:solidFill>
+                <a:latin typeface="+mn-lt"/>
+                <a:ea typeface="+mn-ea"/>
+                <a:cs typeface="+mn-cs"/>
+              </a:defRPr>
+            </a:lvl9pPr>
+          </a:lstStyle>
+          <a:p>
+            <a:r>
+              <a:rPr lang="en-US" dirty="0"/>
+              <a:t>Link to presentation, code, dataset and data generator: </a:t>
+            </a:r>
+          </a:p>
+          <a:p>
+            <a:r>
+              <a:rPr lang="en-US" dirty="0">
+                <a:hlinkClick r:id="rId2"/>
+              </a:rPr>
+              <a:t>https://github.com/mihransimonian/Uva-Block3-Big_Data-Assignment</a:t>
+            </a:r>
+            <a:endParaRPr lang="en-US" dirty="0"/>
+          </a:p>
+        </p:txBody>
+      </p:sp>
     </p:spTree>
     <p:extLst>
       <p:ext uri="{BB962C8B-B14F-4D97-AF65-F5344CB8AC3E}">
@@ -9706,334 +11122,6 @@
 </file>
 
 <file path=ppt/slides/slide30.xml><?xml version="1.0" encoding="utf-8"?>
-<p:sld xmlns:a="http://schemas.openxmlformats.org/drawingml/2006/main" xmlns:r="http://schemas.openxmlformats.org/officeDocument/2006/relationships" xmlns:p="http://schemas.openxmlformats.org/presentationml/2006/main">
-  <p:cSld>
-    <p:spTree>
-      <p:nvGrpSpPr>
-        <p:cNvPr id="1" name=""/>
-        <p:cNvGrpSpPr/>
-        <p:nvPr/>
-      </p:nvGrpSpPr>
-      <p:grpSpPr>
-        <a:xfrm>
-          <a:off x="0" y="0"/>
-          <a:ext cx="0" cy="0"/>
-          <a:chOff x="0" y="0"/>
-          <a:chExt cx="0" cy="0"/>
-        </a:xfrm>
-      </p:grpSpPr>
-      <p:sp>
-        <p:nvSpPr>
-          <p:cNvPr id="2" name="Title 1">
-            <a:extLst>
-              <a:ext uri="{FF2B5EF4-FFF2-40B4-BE49-F238E27FC236}">
-                <a16:creationId xmlns:a16="http://schemas.microsoft.com/office/drawing/2014/main" id="{E2D5BA66-3210-4E08-BF94-0B89CFD35086}"/>
-              </a:ext>
-            </a:extLst>
-          </p:cNvPr>
-          <p:cNvSpPr>
-            <a:spLocks noGrp="1"/>
-          </p:cNvSpPr>
-          <p:nvPr>
-            <p:ph type="title"/>
-          </p:nvPr>
-        </p:nvSpPr>
-        <p:spPr/>
-        <p:txBody>
-          <a:bodyPr/>
-          <a:lstStyle/>
-          <a:p>
-            <a:r>
-              <a:rPr lang="en-US" dirty="0"/>
-              <a:t>Conclusion – A Very Unique System</a:t>
-            </a:r>
-          </a:p>
-        </p:txBody>
-      </p:sp>
-      <p:sp>
-        <p:nvSpPr>
-          <p:cNvPr id="3" name="Content Placeholder 2">
-            <a:extLst>
-              <a:ext uri="{FF2B5EF4-FFF2-40B4-BE49-F238E27FC236}">
-                <a16:creationId xmlns:a16="http://schemas.microsoft.com/office/drawing/2014/main" id="{79832D4C-B6C5-462C-8C0A-2C94E22E9E71}"/>
-              </a:ext>
-            </a:extLst>
-          </p:cNvPr>
-          <p:cNvSpPr>
-            <a:spLocks noGrp="1"/>
-          </p:cNvSpPr>
-          <p:nvPr>
-            <p:ph idx="1"/>
-          </p:nvPr>
-        </p:nvSpPr>
-        <p:spPr/>
-        <p:txBody>
-          <a:bodyPr>
-            <a:normAutofit lnSpcReduction="10000"/>
-          </a:bodyPr>
-          <a:lstStyle/>
-          <a:p>
-            <a:r>
-              <a:rPr lang="en-US" dirty="0"/>
-              <a:t>Combine loose files with specific software</a:t>
-            </a:r>
-          </a:p>
-          <a:p>
-            <a:endParaRPr lang="en-US" dirty="0"/>
-          </a:p>
-          <a:p>
-            <a:r>
-              <a:rPr lang="en-US" dirty="0"/>
-              <a:t>By making software as generic as possible, this can be used for many instances</a:t>
-            </a:r>
-          </a:p>
-          <a:p>
-            <a:endParaRPr lang="en-US" dirty="0"/>
-          </a:p>
-          <a:p>
-            <a:r>
-              <a:rPr lang="en-US" dirty="0"/>
-              <a:t>A relative quick system</a:t>
-            </a:r>
-          </a:p>
-          <a:p>
-            <a:endParaRPr lang="en-US" dirty="0"/>
-          </a:p>
-          <a:p>
-            <a:r>
-              <a:rPr lang="en-US" dirty="0"/>
-              <a:t>Universally deployable</a:t>
-            </a:r>
-          </a:p>
-          <a:p>
-            <a:endParaRPr lang="en-US" dirty="0"/>
-          </a:p>
-          <a:p>
-            <a:r>
-              <a:rPr lang="en-US" dirty="0"/>
-              <a:t>Requires little to no additional libraries (depends on storage output, code provides for installation of libraries)</a:t>
-            </a:r>
-          </a:p>
-        </p:txBody>
-      </p:sp>
-    </p:spTree>
-    <p:extLst>
-      <p:ext uri="{BB962C8B-B14F-4D97-AF65-F5344CB8AC3E}">
-        <p14:creationId xmlns:p14="http://schemas.microsoft.com/office/powerpoint/2010/main" val="1575429779"/>
-      </p:ext>
-    </p:extLst>
-  </p:cSld>
-  <p:clrMapOvr>
-    <a:masterClrMapping/>
-  </p:clrMapOvr>
-</p:sld>
-</file>
-
-<file path=ppt/slides/slide31.xml><?xml version="1.0" encoding="utf-8"?>
-<p:sld xmlns:a="http://schemas.openxmlformats.org/drawingml/2006/main" xmlns:r="http://schemas.openxmlformats.org/officeDocument/2006/relationships" xmlns:p="http://schemas.openxmlformats.org/presentationml/2006/main">
-  <p:cSld>
-    <p:spTree>
-      <p:nvGrpSpPr>
-        <p:cNvPr id="1" name=""/>
-        <p:cNvGrpSpPr/>
-        <p:nvPr/>
-      </p:nvGrpSpPr>
-      <p:grpSpPr>
-        <a:xfrm>
-          <a:off x="0" y="0"/>
-          <a:ext cx="0" cy="0"/>
-          <a:chOff x="0" y="0"/>
-          <a:chExt cx="0" cy="0"/>
-        </a:xfrm>
-      </p:grpSpPr>
-      <p:sp>
-        <p:nvSpPr>
-          <p:cNvPr id="2" name="Title 1">
-            <a:extLst>
-              <a:ext uri="{FF2B5EF4-FFF2-40B4-BE49-F238E27FC236}">
-                <a16:creationId xmlns:a16="http://schemas.microsoft.com/office/drawing/2014/main" id="{B28018A3-3CE5-4418-8CF8-15522FB0C656}"/>
-              </a:ext>
-            </a:extLst>
-          </p:cNvPr>
-          <p:cNvSpPr>
-            <a:spLocks noGrp="1"/>
-          </p:cNvSpPr>
-          <p:nvPr>
-            <p:ph type="title"/>
-          </p:nvPr>
-        </p:nvSpPr>
-        <p:spPr/>
-        <p:txBody>
-          <a:bodyPr/>
-          <a:lstStyle/>
-          <a:p>
-            <a:pPr algn="ctr"/>
-            <a:r>
-              <a:rPr lang="en-US" dirty="0"/>
-              <a:t>Discussion</a:t>
-            </a:r>
-          </a:p>
-        </p:txBody>
-      </p:sp>
-      <p:sp>
-        <p:nvSpPr>
-          <p:cNvPr id="3" name="Text Placeholder 2">
-            <a:extLst>
-              <a:ext uri="{FF2B5EF4-FFF2-40B4-BE49-F238E27FC236}">
-                <a16:creationId xmlns:a16="http://schemas.microsoft.com/office/drawing/2014/main" id="{7E3B1D62-302E-4E1B-B440-3F5B16CA1A4C}"/>
-              </a:ext>
-            </a:extLst>
-          </p:cNvPr>
-          <p:cNvSpPr>
-            <a:spLocks noGrp="1"/>
-          </p:cNvSpPr>
-          <p:nvPr>
-            <p:ph type="body" idx="1"/>
-          </p:nvPr>
-        </p:nvSpPr>
-        <p:spPr/>
-        <p:txBody>
-          <a:bodyPr/>
-          <a:lstStyle/>
-          <a:p>
-            <a:endParaRPr lang="en-US"/>
-          </a:p>
-        </p:txBody>
-      </p:sp>
-    </p:spTree>
-    <p:extLst>
-      <p:ext uri="{BB962C8B-B14F-4D97-AF65-F5344CB8AC3E}">
-        <p14:creationId xmlns:p14="http://schemas.microsoft.com/office/powerpoint/2010/main" val="3095320331"/>
-      </p:ext>
-    </p:extLst>
-  </p:cSld>
-  <p:clrMapOvr>
-    <a:masterClrMapping/>
-  </p:clrMapOvr>
-</p:sld>
-</file>
-
-<file path=ppt/slides/slide32.xml><?xml version="1.0" encoding="utf-8"?>
-<p:sld xmlns:a="http://schemas.openxmlformats.org/drawingml/2006/main" xmlns:r="http://schemas.openxmlformats.org/officeDocument/2006/relationships" xmlns:p="http://schemas.openxmlformats.org/presentationml/2006/main">
-  <p:cSld>
-    <p:spTree>
-      <p:nvGrpSpPr>
-        <p:cNvPr id="1" name=""/>
-        <p:cNvGrpSpPr/>
-        <p:nvPr/>
-      </p:nvGrpSpPr>
-      <p:grpSpPr>
-        <a:xfrm>
-          <a:off x="0" y="0"/>
-          <a:ext cx="0" cy="0"/>
-          <a:chOff x="0" y="0"/>
-          <a:chExt cx="0" cy="0"/>
-        </a:xfrm>
-      </p:grpSpPr>
-      <p:sp>
-        <p:nvSpPr>
-          <p:cNvPr id="2" name="Title 1">
-            <a:extLst>
-              <a:ext uri="{FF2B5EF4-FFF2-40B4-BE49-F238E27FC236}">
-                <a16:creationId xmlns:a16="http://schemas.microsoft.com/office/drawing/2014/main" id="{E2D5BA66-3210-4E08-BF94-0B89CFD35086}"/>
-              </a:ext>
-            </a:extLst>
-          </p:cNvPr>
-          <p:cNvSpPr>
-            <a:spLocks noGrp="1"/>
-          </p:cNvSpPr>
-          <p:nvPr>
-            <p:ph type="title"/>
-          </p:nvPr>
-        </p:nvSpPr>
-        <p:spPr/>
-        <p:txBody>
-          <a:bodyPr/>
-          <a:lstStyle/>
-          <a:p>
-            <a:r>
-              <a:rPr lang="en-US" dirty="0"/>
-              <a:t>Discussion – Humans Remain Involved</a:t>
-            </a:r>
-          </a:p>
-        </p:txBody>
-      </p:sp>
-      <p:sp>
-        <p:nvSpPr>
-          <p:cNvPr id="3" name="Content Placeholder 2">
-            <a:extLst>
-              <a:ext uri="{FF2B5EF4-FFF2-40B4-BE49-F238E27FC236}">
-                <a16:creationId xmlns:a16="http://schemas.microsoft.com/office/drawing/2014/main" id="{79832D4C-B6C5-462C-8C0A-2C94E22E9E71}"/>
-              </a:ext>
-            </a:extLst>
-          </p:cNvPr>
-          <p:cNvSpPr>
-            <a:spLocks noGrp="1"/>
-          </p:cNvSpPr>
-          <p:nvPr>
-            <p:ph idx="1"/>
-          </p:nvPr>
-        </p:nvSpPr>
-        <p:spPr/>
-        <p:txBody>
-          <a:bodyPr>
-            <a:normAutofit/>
-          </a:bodyPr>
-          <a:lstStyle/>
-          <a:p>
-            <a:r>
-              <a:rPr lang="en-US" dirty="0"/>
-              <a:t>Humans are able to adjust csv files, potentially ruining the system</a:t>
-            </a:r>
-          </a:p>
-          <a:p>
-            <a:endParaRPr lang="en-US" dirty="0"/>
-          </a:p>
-          <a:p>
-            <a:r>
-              <a:rPr lang="en-US" dirty="0"/>
-              <a:t>We will always need a human verification</a:t>
-            </a:r>
-          </a:p>
-          <a:p>
-            <a:endParaRPr lang="en-US" dirty="0"/>
-          </a:p>
-          <a:p>
-            <a:r>
-              <a:rPr lang="en-US" dirty="0"/>
-              <a:t>System was specifically designed to tailor the human side of the conversion; being able to use human’s capabilities in </a:t>
-            </a:r>
-            <a:r>
-              <a:rPr lang="en-US" dirty="0" err="1"/>
-              <a:t>interpretating</a:t>
-            </a:r>
-            <a:r>
-              <a:rPr lang="en-US" dirty="0"/>
-              <a:t> information and thus assign a new measurement unit system</a:t>
-            </a:r>
-          </a:p>
-          <a:p>
-            <a:endParaRPr lang="en-US" dirty="0"/>
-          </a:p>
-          <a:p>
-            <a:endParaRPr lang="en-US" dirty="0"/>
-          </a:p>
-        </p:txBody>
-      </p:sp>
-    </p:spTree>
-    <p:extLst>
-      <p:ext uri="{BB962C8B-B14F-4D97-AF65-F5344CB8AC3E}">
-        <p14:creationId xmlns:p14="http://schemas.microsoft.com/office/powerpoint/2010/main" val="2697133627"/>
-      </p:ext>
-    </p:extLst>
-  </p:cSld>
-  <p:clrMapOvr>
-    <a:masterClrMapping/>
-  </p:clrMapOvr>
-</p:sld>
-</file>
-
-<file path=ppt/slides/slide33.xml><?xml version="1.0" encoding="utf-8"?>
 <p:sld xmlns:a="http://schemas.openxmlformats.org/drawingml/2006/main" xmlns:r="http://schemas.openxmlformats.org/officeDocument/2006/relationships" xmlns:p="http://schemas.openxmlformats.org/presentationml/2006/main">
   <p:cSld>
     <p:spTree>
@@ -10233,7 +11321,7 @@
 </p:sld>
 </file>
 
-<file path=ppt/slides/slide34.xml><?xml version="1.0" encoding="utf-8"?>
+<file path=ppt/slides/slide31.xml><?xml version="1.0" encoding="utf-8"?>
 <p:sld xmlns:a="http://schemas.openxmlformats.org/drawingml/2006/main" xmlns:r="http://schemas.openxmlformats.org/officeDocument/2006/relationships" xmlns:p="http://schemas.openxmlformats.org/presentationml/2006/main">
   <p:cSld>
     <p:spTree>
@@ -11380,6 +12468,269 @@
           <a:lstStyle/>
           <a:p>
             <a:endParaRPr lang="en-US"/>
+          </a:p>
+        </p:txBody>
+      </p:sp>
+      <p:sp>
+        <p:nvSpPr>
+          <p:cNvPr id="4" name="Text Placeholder 2">
+            <a:extLst>
+              <a:ext uri="{FF2B5EF4-FFF2-40B4-BE49-F238E27FC236}">
+                <a16:creationId xmlns:a16="http://schemas.microsoft.com/office/drawing/2014/main" id="{E8E2F0A1-B41C-446A-A177-602AF9E98F7E}"/>
+              </a:ext>
+            </a:extLst>
+          </p:cNvPr>
+          <p:cNvSpPr txBox="1">
+            <a:spLocks/>
+          </p:cNvSpPr>
+          <p:nvPr/>
+        </p:nvSpPr>
+        <p:spPr>
+          <a:xfrm>
+            <a:off x="677335" y="5697135"/>
+            <a:ext cx="8596668" cy="860400"/>
+          </a:xfrm>
+          <a:prstGeom prst="rect">
+            <a:avLst/>
+          </a:prstGeom>
+        </p:spPr>
+        <p:txBody>
+          <a:bodyPr vert="horz" lIns="91440" tIns="45720" rIns="91440" bIns="45720" rtlCol="0" anchor="t">
+            <a:normAutofit/>
+          </a:bodyPr>
+          <a:lstStyle>
+            <a:lvl1pPr marL="0" indent="0" algn="r" defTabSz="457200" rtl="0" eaLnBrk="1" latinLnBrk="0" hangingPunct="1">
+              <a:spcBef>
+                <a:spcPts val="1000"/>
+              </a:spcBef>
+              <a:spcAft>
+                <a:spcPts val="0"/>
+              </a:spcAft>
+              <a:buClr>
+                <a:schemeClr val="accent1"/>
+              </a:buClr>
+              <a:buSzPct val="80000"/>
+              <a:buFont typeface="Wingdings 3" charset="2"/>
+              <a:buNone/>
+              <a:defRPr sz="1800" kern="1200">
+                <a:solidFill>
+                  <a:schemeClr val="tx1">
+                    <a:lumMod val="50000"/>
+                    <a:lumOff val="50000"/>
+                  </a:schemeClr>
+                </a:solidFill>
+                <a:latin typeface="+mn-lt"/>
+                <a:ea typeface="+mn-ea"/>
+                <a:cs typeface="+mn-cs"/>
+              </a:defRPr>
+            </a:lvl1pPr>
+            <a:lvl2pPr marL="457200" indent="0" algn="ctr" defTabSz="457200" rtl="0" eaLnBrk="1" latinLnBrk="0" hangingPunct="1">
+              <a:spcBef>
+                <a:spcPts val="1000"/>
+              </a:spcBef>
+              <a:spcAft>
+                <a:spcPts val="0"/>
+              </a:spcAft>
+              <a:buClr>
+                <a:schemeClr val="accent1"/>
+              </a:buClr>
+              <a:buSzPct val="80000"/>
+              <a:buFont typeface="Wingdings 3" charset="2"/>
+              <a:buNone/>
+              <a:defRPr sz="1600" kern="1200">
+                <a:solidFill>
+                  <a:schemeClr val="tx1">
+                    <a:tint val="75000"/>
+                  </a:schemeClr>
+                </a:solidFill>
+                <a:latin typeface="+mn-lt"/>
+                <a:ea typeface="+mn-ea"/>
+                <a:cs typeface="+mn-cs"/>
+              </a:defRPr>
+            </a:lvl2pPr>
+            <a:lvl3pPr marL="914400" indent="0" algn="ctr" defTabSz="457200" rtl="0" eaLnBrk="1" latinLnBrk="0" hangingPunct="1">
+              <a:spcBef>
+                <a:spcPts val="1000"/>
+              </a:spcBef>
+              <a:spcAft>
+                <a:spcPts val="0"/>
+              </a:spcAft>
+              <a:buClr>
+                <a:schemeClr val="accent1"/>
+              </a:buClr>
+              <a:buSzPct val="80000"/>
+              <a:buFont typeface="Wingdings 3" charset="2"/>
+              <a:buNone/>
+              <a:defRPr sz="1400" kern="1200">
+                <a:solidFill>
+                  <a:schemeClr val="tx1">
+                    <a:tint val="75000"/>
+                  </a:schemeClr>
+                </a:solidFill>
+                <a:latin typeface="+mn-lt"/>
+                <a:ea typeface="+mn-ea"/>
+                <a:cs typeface="+mn-cs"/>
+              </a:defRPr>
+            </a:lvl3pPr>
+            <a:lvl4pPr marL="1371600" indent="0" algn="ctr" defTabSz="457200" rtl="0" eaLnBrk="1" latinLnBrk="0" hangingPunct="1">
+              <a:spcBef>
+                <a:spcPts val="1000"/>
+              </a:spcBef>
+              <a:spcAft>
+                <a:spcPts val="0"/>
+              </a:spcAft>
+              <a:buClr>
+                <a:schemeClr val="accent1"/>
+              </a:buClr>
+              <a:buSzPct val="80000"/>
+              <a:buFont typeface="Wingdings 3" charset="2"/>
+              <a:buNone/>
+              <a:defRPr sz="1200" kern="1200">
+                <a:solidFill>
+                  <a:schemeClr val="tx1">
+                    <a:tint val="75000"/>
+                  </a:schemeClr>
+                </a:solidFill>
+                <a:latin typeface="+mn-lt"/>
+                <a:ea typeface="+mn-ea"/>
+                <a:cs typeface="+mn-cs"/>
+              </a:defRPr>
+            </a:lvl4pPr>
+            <a:lvl5pPr marL="1828800" indent="0" algn="ctr" defTabSz="457200" rtl="0" eaLnBrk="1" latinLnBrk="0" hangingPunct="1">
+              <a:spcBef>
+                <a:spcPts val="1000"/>
+              </a:spcBef>
+              <a:spcAft>
+                <a:spcPts val="0"/>
+              </a:spcAft>
+              <a:buClr>
+                <a:schemeClr val="accent1"/>
+              </a:buClr>
+              <a:buSzPct val="80000"/>
+              <a:buFont typeface="Wingdings 3" charset="2"/>
+              <a:buNone/>
+              <a:defRPr sz="1200" kern="1200">
+                <a:solidFill>
+                  <a:schemeClr val="tx1">
+                    <a:tint val="75000"/>
+                  </a:schemeClr>
+                </a:solidFill>
+                <a:latin typeface="+mn-lt"/>
+                <a:ea typeface="+mn-ea"/>
+                <a:cs typeface="+mn-cs"/>
+              </a:defRPr>
+            </a:lvl5pPr>
+            <a:lvl6pPr marL="2286000" indent="0" algn="ctr" defTabSz="457200" rtl="0" eaLnBrk="1" latinLnBrk="0" hangingPunct="1">
+              <a:spcBef>
+                <a:spcPts val="1000"/>
+              </a:spcBef>
+              <a:spcAft>
+                <a:spcPts val="0"/>
+              </a:spcAft>
+              <a:buClr>
+                <a:schemeClr val="accent1"/>
+              </a:buClr>
+              <a:buSzPct val="80000"/>
+              <a:buFont typeface="Wingdings 3" charset="2"/>
+              <a:buNone/>
+              <a:defRPr sz="1200" kern="1200">
+                <a:solidFill>
+                  <a:schemeClr val="tx1">
+                    <a:tint val="75000"/>
+                  </a:schemeClr>
+                </a:solidFill>
+                <a:latin typeface="+mn-lt"/>
+                <a:ea typeface="+mn-ea"/>
+                <a:cs typeface="+mn-cs"/>
+              </a:defRPr>
+            </a:lvl6pPr>
+            <a:lvl7pPr marL="2743200" indent="0" algn="ctr" defTabSz="457200" rtl="0" eaLnBrk="1" latinLnBrk="0" hangingPunct="1">
+              <a:spcBef>
+                <a:spcPts val="1000"/>
+              </a:spcBef>
+              <a:spcAft>
+                <a:spcPts val="0"/>
+              </a:spcAft>
+              <a:buClr>
+                <a:schemeClr val="accent1"/>
+              </a:buClr>
+              <a:buSzPct val="80000"/>
+              <a:buFont typeface="Wingdings 3" charset="2"/>
+              <a:buNone/>
+              <a:defRPr sz="1200" kern="1200">
+                <a:solidFill>
+                  <a:schemeClr val="tx1">
+                    <a:tint val="75000"/>
+                  </a:schemeClr>
+                </a:solidFill>
+                <a:latin typeface="+mn-lt"/>
+                <a:ea typeface="+mn-ea"/>
+                <a:cs typeface="+mn-cs"/>
+              </a:defRPr>
+            </a:lvl7pPr>
+            <a:lvl8pPr marL="3200400" indent="0" algn="ctr" defTabSz="457200" rtl="0" eaLnBrk="1" latinLnBrk="0" hangingPunct="1">
+              <a:spcBef>
+                <a:spcPts val="1000"/>
+              </a:spcBef>
+              <a:spcAft>
+                <a:spcPts val="0"/>
+              </a:spcAft>
+              <a:buClr>
+                <a:schemeClr val="accent1"/>
+              </a:buClr>
+              <a:buSzPct val="80000"/>
+              <a:buFont typeface="Wingdings 3" charset="2"/>
+              <a:buNone/>
+              <a:defRPr sz="1200" kern="1200">
+                <a:solidFill>
+                  <a:schemeClr val="tx1">
+                    <a:tint val="75000"/>
+                  </a:schemeClr>
+                </a:solidFill>
+                <a:latin typeface="+mn-lt"/>
+                <a:ea typeface="+mn-ea"/>
+                <a:cs typeface="+mn-cs"/>
+              </a:defRPr>
+            </a:lvl8pPr>
+            <a:lvl9pPr marL="3657600" indent="0" algn="ctr" defTabSz="457200" rtl="0" eaLnBrk="1" latinLnBrk="0" hangingPunct="1">
+              <a:spcBef>
+                <a:spcPts val="1000"/>
+              </a:spcBef>
+              <a:spcAft>
+                <a:spcPts val="0"/>
+              </a:spcAft>
+              <a:buClr>
+                <a:schemeClr val="accent1"/>
+              </a:buClr>
+              <a:buSzPct val="80000"/>
+              <a:buFont typeface="Wingdings 3" charset="2"/>
+              <a:buNone/>
+              <a:defRPr sz="1200" kern="1200">
+                <a:solidFill>
+                  <a:schemeClr val="tx1">
+                    <a:tint val="75000"/>
+                  </a:schemeClr>
+                </a:solidFill>
+                <a:latin typeface="+mn-lt"/>
+                <a:ea typeface="+mn-ea"/>
+                <a:cs typeface="+mn-cs"/>
+              </a:defRPr>
+            </a:lvl9pPr>
+          </a:lstStyle>
+          <a:p>
+            <a:r>
+              <a:rPr lang="en-US" dirty="0"/>
+              <a:t>Link to presentation, code, dataset and data generator: </a:t>
+            </a:r>
+          </a:p>
+          <a:p>
+            <a:r>
+              <a:rPr lang="en-US" dirty="0">
+                <a:hlinkClick r:id="rId2"/>
+              </a:rPr>
+              <a:t>https://github.com/mihransimonian/Uva-Block3-Big_Data-Assignment</a:t>
+            </a:r>
+            <a:endParaRPr lang="en-US" dirty="0"/>
           </a:p>
         </p:txBody>
       </p:sp>

</xml_diff>